<commit_message>
added notes from lecture
</commit_message>
<xml_diff>
--- a/Week 2 -- mixed-effects/Lecture 2/Lecture 2 -- Mixed-effects models.pptx
+++ b/Week 2 -- mixed-effects/Lecture 2/Lecture 2 -- Mixed-effects models.pptx
@@ -215,7 +215,7 @@
           <a:p>
             <a:fld id="{1522831B-4FE3-4D45-950B-0D2C6BB2DD76}" type="datetimeFigureOut">
               <a:rPr lang="en-US" smtClean="0"/>
-              <a:t>4/2/2018</a:t>
+              <a:t>4/3/2018</a:t>
             </a:fld>
             <a:endParaRPr lang="en-US"/>
           </a:p>
@@ -279,38 +279,37 @@
           <a:p>
             <a:pPr lvl="0"/>
             <a:r>
-              <a:rPr lang="en-US" smtClean="0"/>
+              <a:rPr lang="en-US"/>
               <a:t>Edit Master text styles</a:t>
             </a:r>
           </a:p>
           <a:p>
             <a:pPr lvl="1"/>
             <a:r>
-              <a:rPr lang="en-US" smtClean="0"/>
+              <a:rPr lang="en-US"/>
               <a:t>Second level</a:t>
             </a:r>
           </a:p>
           <a:p>
             <a:pPr lvl="2"/>
             <a:r>
-              <a:rPr lang="en-US" smtClean="0"/>
+              <a:rPr lang="en-US"/>
               <a:t>Third level</a:t>
             </a:r>
           </a:p>
           <a:p>
             <a:pPr lvl="3"/>
             <a:r>
-              <a:rPr lang="en-US" smtClean="0"/>
+              <a:rPr lang="en-US"/>
               <a:t>Fourth level</a:t>
             </a:r>
           </a:p>
           <a:p>
             <a:pPr lvl="4"/>
             <a:r>
-              <a:rPr lang="en-US" smtClean="0"/>
+              <a:rPr lang="en-US"/>
               <a:t>Fifth level</a:t>
             </a:r>
-            <a:endParaRPr lang="en-US"/>
           </a:p>
         </p:txBody>
       </p:sp>
@@ -483,6 +482,1404 @@
 </p:notesMaster>
 </file>
 
+<file path=ppt/notesSlides/notesSlide1.xml><?xml version="1.0" encoding="utf-8"?>
+<p:notes xmlns:a="http://schemas.openxmlformats.org/drawingml/2006/main" xmlns:r="http://schemas.openxmlformats.org/officeDocument/2006/relationships" xmlns:p="http://schemas.openxmlformats.org/presentationml/2006/main">
+  <p:cSld>
+    <p:spTree>
+      <p:nvGrpSpPr>
+        <p:cNvPr id="1" name=""/>
+        <p:cNvGrpSpPr/>
+        <p:nvPr/>
+      </p:nvGrpSpPr>
+      <p:grpSpPr>
+        <a:xfrm>
+          <a:off x="0" y="0"/>
+          <a:ext cx="0" cy="0"/>
+          <a:chOff x="0" y="0"/>
+          <a:chExt cx="0" cy="0"/>
+        </a:xfrm>
+      </p:grpSpPr>
+      <p:sp>
+        <p:nvSpPr>
+          <p:cNvPr id="2" name="Slide Image Placeholder 1"/>
+          <p:cNvSpPr>
+            <a:spLocks noGrp="1" noRot="1" noChangeAspect="1"/>
+          </p:cNvSpPr>
+          <p:nvPr>
+            <p:ph type="sldImg"/>
+          </p:nvPr>
+        </p:nvSpPr>
+        <p:spPr/>
+      </p:sp>
+      <p:sp>
+        <p:nvSpPr>
+          <p:cNvPr id="3" name="Notes Placeholder 2"/>
+          <p:cNvSpPr>
+            <a:spLocks noGrp="1"/>
+          </p:cNvSpPr>
+          <p:nvPr>
+            <p:ph type="body" idx="1"/>
+          </p:nvPr>
+        </p:nvSpPr>
+        <p:spPr/>
+        <p:txBody>
+          <a:bodyPr/>
+          <a:lstStyle/>
+          <a:p>
+            <a:endParaRPr lang="en-US" dirty="0"/>
+          </a:p>
+        </p:txBody>
+      </p:sp>
+      <p:sp>
+        <p:nvSpPr>
+          <p:cNvPr id="4" name="Slide Number Placeholder 3"/>
+          <p:cNvSpPr>
+            <a:spLocks noGrp="1"/>
+          </p:cNvSpPr>
+          <p:nvPr>
+            <p:ph type="sldNum" sz="quarter" idx="10"/>
+          </p:nvPr>
+        </p:nvSpPr>
+        <p:spPr/>
+        <p:txBody>
+          <a:bodyPr/>
+          <a:lstStyle/>
+          <a:p>
+            <a:fld id="{DCDC1745-AA19-4253-83E6-9EAE9D7EFFC9}" type="slidenum">
+              <a:rPr lang="en-US" smtClean="0"/>
+              <a:t>1</a:t>
+            </a:fld>
+            <a:endParaRPr lang="en-US"/>
+          </a:p>
+        </p:txBody>
+      </p:sp>
+    </p:spTree>
+    <p:extLst>
+      <p:ext uri="{BB962C8B-B14F-4D97-AF65-F5344CB8AC3E}">
+        <p14:creationId xmlns:p14="http://schemas.microsoft.com/office/powerpoint/2010/main" val="2816542578"/>
+      </p:ext>
+    </p:extLst>
+  </p:cSld>
+  <p:clrMapOvr>
+    <a:masterClrMapping/>
+  </p:clrMapOvr>
+</p:notes>
+</file>
+
+<file path=ppt/notesSlides/notesSlide10.xml><?xml version="1.0" encoding="utf-8"?>
+<p:notes xmlns:a="http://schemas.openxmlformats.org/drawingml/2006/main" xmlns:r="http://schemas.openxmlformats.org/officeDocument/2006/relationships" xmlns:p="http://schemas.openxmlformats.org/presentationml/2006/main">
+  <p:cSld>
+    <p:spTree>
+      <p:nvGrpSpPr>
+        <p:cNvPr id="1" name=""/>
+        <p:cNvGrpSpPr/>
+        <p:nvPr/>
+      </p:nvGrpSpPr>
+      <p:grpSpPr>
+        <a:xfrm>
+          <a:off x="0" y="0"/>
+          <a:ext cx="0" cy="0"/>
+          <a:chOff x="0" y="0"/>
+          <a:chExt cx="0" cy="0"/>
+        </a:xfrm>
+      </p:grpSpPr>
+      <p:sp>
+        <p:nvSpPr>
+          <p:cNvPr id="2" name="Slide Image Placeholder 1"/>
+          <p:cNvSpPr>
+            <a:spLocks noGrp="1" noRot="1" noChangeAspect="1"/>
+          </p:cNvSpPr>
+          <p:nvPr>
+            <p:ph type="sldImg"/>
+          </p:nvPr>
+        </p:nvSpPr>
+        <p:spPr/>
+      </p:sp>
+      <p:sp>
+        <p:nvSpPr>
+          <p:cNvPr id="3" name="Notes Placeholder 2"/>
+          <p:cNvSpPr>
+            <a:spLocks noGrp="1"/>
+          </p:cNvSpPr>
+          <p:nvPr>
+            <p:ph type="body" idx="1"/>
+          </p:nvPr>
+        </p:nvSpPr>
+        <p:spPr/>
+        <p:txBody>
+          <a:bodyPr/>
+          <a:lstStyle/>
+          <a:p>
+            <a:endParaRPr lang="en-US" dirty="0"/>
+          </a:p>
+        </p:txBody>
+      </p:sp>
+      <p:sp>
+        <p:nvSpPr>
+          <p:cNvPr id="4" name="Slide Number Placeholder 3"/>
+          <p:cNvSpPr>
+            <a:spLocks noGrp="1"/>
+          </p:cNvSpPr>
+          <p:nvPr>
+            <p:ph type="sldNum" sz="quarter" idx="10"/>
+          </p:nvPr>
+        </p:nvSpPr>
+        <p:spPr/>
+        <p:txBody>
+          <a:bodyPr/>
+          <a:lstStyle/>
+          <a:p>
+            <a:fld id="{DCDC1745-AA19-4253-83E6-9EAE9D7EFFC9}" type="slidenum">
+              <a:rPr lang="en-US" smtClean="0"/>
+              <a:t>12</a:t>
+            </a:fld>
+            <a:endParaRPr lang="en-US"/>
+          </a:p>
+        </p:txBody>
+      </p:sp>
+    </p:spTree>
+    <p:extLst>
+      <p:ext uri="{BB962C8B-B14F-4D97-AF65-F5344CB8AC3E}">
+        <p14:creationId xmlns:p14="http://schemas.microsoft.com/office/powerpoint/2010/main" val="2543363330"/>
+      </p:ext>
+    </p:extLst>
+  </p:cSld>
+  <p:clrMapOvr>
+    <a:masterClrMapping/>
+  </p:clrMapOvr>
+</p:notes>
+</file>
+
+<file path=ppt/notesSlides/notesSlide11.xml><?xml version="1.0" encoding="utf-8"?>
+<p:notes xmlns:a="http://schemas.openxmlformats.org/drawingml/2006/main" xmlns:r="http://schemas.openxmlformats.org/officeDocument/2006/relationships" xmlns:p="http://schemas.openxmlformats.org/presentationml/2006/main">
+  <p:cSld>
+    <p:spTree>
+      <p:nvGrpSpPr>
+        <p:cNvPr id="1" name=""/>
+        <p:cNvGrpSpPr/>
+        <p:nvPr/>
+      </p:nvGrpSpPr>
+      <p:grpSpPr>
+        <a:xfrm>
+          <a:off x="0" y="0"/>
+          <a:ext cx="0" cy="0"/>
+          <a:chOff x="0" y="0"/>
+          <a:chExt cx="0" cy="0"/>
+        </a:xfrm>
+      </p:grpSpPr>
+      <p:sp>
+        <p:nvSpPr>
+          <p:cNvPr id="2" name="Slide Image Placeholder 1"/>
+          <p:cNvSpPr>
+            <a:spLocks noGrp="1" noRot="1" noChangeAspect="1"/>
+          </p:cNvSpPr>
+          <p:nvPr>
+            <p:ph type="sldImg"/>
+          </p:nvPr>
+        </p:nvSpPr>
+        <p:spPr/>
+      </p:sp>
+      <p:sp>
+        <p:nvSpPr>
+          <p:cNvPr id="3" name="Notes Placeholder 2"/>
+          <p:cNvSpPr>
+            <a:spLocks noGrp="1"/>
+          </p:cNvSpPr>
+          <p:nvPr>
+            <p:ph type="body" idx="1"/>
+          </p:nvPr>
+        </p:nvSpPr>
+        <p:spPr/>
+        <p:txBody>
+          <a:bodyPr/>
+          <a:lstStyle/>
+          <a:p>
+            <a:r>
+              <a:rPr lang="en-US" dirty="0"/>
+              <a:t>Integrals are hard, this is </a:t>
+            </a:r>
+            <a:r>
+              <a:rPr lang="en-US" dirty="0" err="1"/>
+              <a:t>hwy</a:t>
+            </a:r>
+            <a:r>
+              <a:rPr lang="en-US" dirty="0"/>
+              <a:t> these are hard</a:t>
+            </a:r>
+          </a:p>
+          <a:p>
+            <a:r>
+              <a:rPr lang="en-US" dirty="0"/>
+              <a:t>But we can approximate the probability by subtracting half the log of the determinant of the hessian matrix</a:t>
+            </a:r>
+          </a:p>
+        </p:txBody>
+      </p:sp>
+      <p:sp>
+        <p:nvSpPr>
+          <p:cNvPr id="4" name="Slide Number Placeholder 3"/>
+          <p:cNvSpPr>
+            <a:spLocks noGrp="1"/>
+          </p:cNvSpPr>
+          <p:nvPr>
+            <p:ph type="sldNum" sz="quarter" idx="10"/>
+          </p:nvPr>
+        </p:nvSpPr>
+        <p:spPr/>
+        <p:txBody>
+          <a:bodyPr/>
+          <a:lstStyle/>
+          <a:p>
+            <a:fld id="{DCDC1745-AA19-4253-83E6-9EAE9D7EFFC9}" type="slidenum">
+              <a:rPr lang="en-US" smtClean="0"/>
+              <a:t>14</a:t>
+            </a:fld>
+            <a:endParaRPr lang="en-US"/>
+          </a:p>
+        </p:txBody>
+      </p:sp>
+    </p:spTree>
+    <p:extLst>
+      <p:ext uri="{BB962C8B-B14F-4D97-AF65-F5344CB8AC3E}">
+        <p14:creationId xmlns:p14="http://schemas.microsoft.com/office/powerpoint/2010/main" val="1360604022"/>
+      </p:ext>
+    </p:extLst>
+  </p:cSld>
+  <p:clrMapOvr>
+    <a:masterClrMapping/>
+  </p:clrMapOvr>
+</p:notes>
+</file>
+
+<file path=ppt/notesSlides/notesSlide12.xml><?xml version="1.0" encoding="utf-8"?>
+<p:notes xmlns:a="http://schemas.openxmlformats.org/drawingml/2006/main" xmlns:r="http://schemas.openxmlformats.org/officeDocument/2006/relationships" xmlns:p="http://schemas.openxmlformats.org/presentationml/2006/main">
+  <p:cSld>
+    <p:spTree>
+      <p:nvGrpSpPr>
+        <p:cNvPr id="1" name=""/>
+        <p:cNvGrpSpPr/>
+        <p:nvPr/>
+      </p:nvGrpSpPr>
+      <p:grpSpPr>
+        <a:xfrm>
+          <a:off x="0" y="0"/>
+          <a:ext cx="0" cy="0"/>
+          <a:chOff x="0" y="0"/>
+          <a:chExt cx="0" cy="0"/>
+        </a:xfrm>
+      </p:grpSpPr>
+      <p:sp>
+        <p:nvSpPr>
+          <p:cNvPr id="2" name="Slide Image Placeholder 1"/>
+          <p:cNvSpPr>
+            <a:spLocks noGrp="1" noRot="1" noChangeAspect="1"/>
+          </p:cNvSpPr>
+          <p:nvPr>
+            <p:ph type="sldImg"/>
+          </p:nvPr>
+        </p:nvSpPr>
+        <p:spPr/>
+      </p:sp>
+      <p:sp>
+        <p:nvSpPr>
+          <p:cNvPr id="3" name="Notes Placeholder 2"/>
+          <p:cNvSpPr>
+            <a:spLocks noGrp="1"/>
+          </p:cNvSpPr>
+          <p:nvPr>
+            <p:ph type="body" idx="1"/>
+          </p:nvPr>
+        </p:nvSpPr>
+        <p:spPr/>
+        <p:txBody>
+          <a:bodyPr/>
+          <a:lstStyle/>
+          <a:p>
+            <a:r>
+              <a:rPr lang="en-US"/>
+              <a:t>Loglikehilood </a:t>
+            </a:r>
+            <a:r>
+              <a:rPr lang="en-US" dirty="0"/>
+              <a:t>is now </a:t>
+            </a:r>
+            <a:r>
+              <a:rPr lang="en-US" dirty="0" err="1"/>
+              <a:t>prob</a:t>
+            </a:r>
+            <a:r>
+              <a:rPr lang="en-US" dirty="0"/>
+              <a:t> of data and </a:t>
+            </a:r>
+            <a:r>
+              <a:rPr lang="en-US" dirty="0" err="1"/>
+              <a:t>prob</a:t>
+            </a:r>
+            <a:r>
+              <a:rPr lang="en-US" dirty="0"/>
+              <a:t> of “augmented data”</a:t>
+            </a:r>
+          </a:p>
+          <a:p>
+            <a:r>
+              <a:rPr lang="en-US" dirty="0"/>
+              <a:t>Inner optimization—max </a:t>
+            </a:r>
+            <a:r>
+              <a:rPr lang="en-US" dirty="0" err="1"/>
+              <a:t>wrt</a:t>
+            </a:r>
+            <a:r>
+              <a:rPr lang="en-US" dirty="0"/>
+              <a:t> random effects</a:t>
+            </a:r>
+          </a:p>
+          <a:p>
+            <a:r>
+              <a:rPr lang="en-US" dirty="0"/>
+              <a:t>Outer approximation—max </a:t>
+            </a:r>
+            <a:r>
+              <a:rPr lang="en-US" dirty="0" err="1"/>
+              <a:t>wrt</a:t>
+            </a:r>
+            <a:r>
+              <a:rPr lang="en-US" dirty="0"/>
+              <a:t> the fixed effects</a:t>
+            </a:r>
+          </a:p>
+          <a:p>
+            <a:r>
+              <a:rPr lang="en-US" dirty="0"/>
+              <a:t>Then iterate between the two</a:t>
+            </a:r>
+          </a:p>
+        </p:txBody>
+      </p:sp>
+      <p:sp>
+        <p:nvSpPr>
+          <p:cNvPr id="4" name="Slide Number Placeholder 3"/>
+          <p:cNvSpPr>
+            <a:spLocks noGrp="1"/>
+          </p:cNvSpPr>
+          <p:nvPr>
+            <p:ph type="sldNum" sz="quarter" idx="10"/>
+          </p:nvPr>
+        </p:nvSpPr>
+        <p:spPr/>
+        <p:txBody>
+          <a:bodyPr/>
+          <a:lstStyle/>
+          <a:p>
+            <a:fld id="{DCDC1745-AA19-4253-83E6-9EAE9D7EFFC9}" type="slidenum">
+              <a:rPr lang="en-US" smtClean="0"/>
+              <a:t>15</a:t>
+            </a:fld>
+            <a:endParaRPr lang="en-US"/>
+          </a:p>
+        </p:txBody>
+      </p:sp>
+    </p:spTree>
+    <p:extLst>
+      <p:ext uri="{BB962C8B-B14F-4D97-AF65-F5344CB8AC3E}">
+        <p14:creationId xmlns:p14="http://schemas.microsoft.com/office/powerpoint/2010/main" val="2715369929"/>
+      </p:ext>
+    </p:extLst>
+  </p:cSld>
+  <p:clrMapOvr>
+    <a:masterClrMapping/>
+  </p:clrMapOvr>
+</p:notes>
+</file>
+
+<file path=ppt/notesSlides/notesSlide13.xml><?xml version="1.0" encoding="utf-8"?>
+<p:notes xmlns:a="http://schemas.openxmlformats.org/drawingml/2006/main" xmlns:r="http://schemas.openxmlformats.org/officeDocument/2006/relationships" xmlns:p="http://schemas.openxmlformats.org/presentationml/2006/main">
+  <p:cSld>
+    <p:spTree>
+      <p:nvGrpSpPr>
+        <p:cNvPr id="1" name=""/>
+        <p:cNvGrpSpPr/>
+        <p:nvPr/>
+      </p:nvGrpSpPr>
+      <p:grpSpPr>
+        <a:xfrm>
+          <a:off x="0" y="0"/>
+          <a:ext cx="0" cy="0"/>
+          <a:chOff x="0" y="0"/>
+          <a:chExt cx="0" cy="0"/>
+        </a:xfrm>
+      </p:grpSpPr>
+      <p:sp>
+        <p:nvSpPr>
+          <p:cNvPr id="2" name="Slide Image Placeholder 1"/>
+          <p:cNvSpPr>
+            <a:spLocks noGrp="1" noRot="1" noChangeAspect="1"/>
+          </p:cNvSpPr>
+          <p:nvPr>
+            <p:ph type="sldImg"/>
+          </p:nvPr>
+        </p:nvSpPr>
+        <p:spPr/>
+      </p:sp>
+      <p:sp>
+        <p:nvSpPr>
+          <p:cNvPr id="3" name="Notes Placeholder 2"/>
+          <p:cNvSpPr>
+            <a:spLocks noGrp="1"/>
+          </p:cNvSpPr>
+          <p:nvPr>
+            <p:ph type="body" idx="1"/>
+          </p:nvPr>
+        </p:nvSpPr>
+        <p:spPr/>
+        <p:txBody>
+          <a:bodyPr/>
+          <a:lstStyle/>
+          <a:p>
+            <a:pPr marL="0" marR="0" lvl="0" indent="0" algn="l" defTabSz="914400" rtl="0" eaLnBrk="1" fontAlgn="auto" latinLnBrk="0" hangingPunct="1">
+              <a:lnSpc>
+                <a:spcPct val="100000"/>
+              </a:lnSpc>
+              <a:spcBef>
+                <a:spcPts val="0"/>
+              </a:spcBef>
+              <a:spcAft>
+                <a:spcPts val="0"/>
+              </a:spcAft>
+              <a:buClrTx/>
+              <a:buSzTx/>
+              <a:buFontTx/>
+              <a:buNone/>
+              <a:tabLst/>
+              <a:defRPr/>
+            </a:pPr>
+            <a:r>
+              <a:rPr lang="en-US" dirty="0"/>
+              <a:t>James-Stein estimator is one of the ways that people derived mixed effects model and Shrinkage estimator </a:t>
+            </a:r>
+          </a:p>
+          <a:p>
+            <a:endParaRPr lang="en-US" dirty="0"/>
+          </a:p>
+        </p:txBody>
+      </p:sp>
+      <p:sp>
+        <p:nvSpPr>
+          <p:cNvPr id="4" name="Slide Number Placeholder 3"/>
+          <p:cNvSpPr>
+            <a:spLocks noGrp="1"/>
+          </p:cNvSpPr>
+          <p:nvPr>
+            <p:ph type="sldNum" sz="quarter" idx="10"/>
+          </p:nvPr>
+        </p:nvSpPr>
+        <p:spPr/>
+        <p:txBody>
+          <a:bodyPr/>
+          <a:lstStyle/>
+          <a:p>
+            <a:fld id="{DCDC1745-AA19-4253-83E6-9EAE9D7EFFC9}" type="slidenum">
+              <a:rPr lang="en-US" smtClean="0"/>
+              <a:t>17</a:t>
+            </a:fld>
+            <a:endParaRPr lang="en-US"/>
+          </a:p>
+        </p:txBody>
+      </p:sp>
+    </p:spTree>
+    <p:extLst>
+      <p:ext uri="{BB962C8B-B14F-4D97-AF65-F5344CB8AC3E}">
+        <p14:creationId xmlns:p14="http://schemas.microsoft.com/office/powerpoint/2010/main" val="2399561409"/>
+      </p:ext>
+    </p:extLst>
+  </p:cSld>
+  <p:clrMapOvr>
+    <a:masterClrMapping/>
+  </p:clrMapOvr>
+</p:notes>
+</file>
+
+<file path=ppt/notesSlides/notesSlide14.xml><?xml version="1.0" encoding="utf-8"?>
+<p:notes xmlns:a="http://schemas.openxmlformats.org/drawingml/2006/main" xmlns:r="http://schemas.openxmlformats.org/officeDocument/2006/relationships" xmlns:p="http://schemas.openxmlformats.org/presentationml/2006/main">
+  <p:cSld>
+    <p:spTree>
+      <p:nvGrpSpPr>
+        <p:cNvPr id="1" name=""/>
+        <p:cNvGrpSpPr/>
+        <p:nvPr/>
+      </p:nvGrpSpPr>
+      <p:grpSpPr>
+        <a:xfrm>
+          <a:off x="0" y="0"/>
+          <a:ext cx="0" cy="0"/>
+          <a:chOff x="0" y="0"/>
+          <a:chExt cx="0" cy="0"/>
+        </a:xfrm>
+      </p:grpSpPr>
+      <p:sp>
+        <p:nvSpPr>
+          <p:cNvPr id="2" name="Slide Image Placeholder 1"/>
+          <p:cNvSpPr>
+            <a:spLocks noGrp="1" noRot="1" noChangeAspect="1"/>
+          </p:cNvSpPr>
+          <p:nvPr>
+            <p:ph type="sldImg"/>
+          </p:nvPr>
+        </p:nvSpPr>
+        <p:spPr/>
+      </p:sp>
+      <p:sp>
+        <p:nvSpPr>
+          <p:cNvPr id="3" name="Notes Placeholder 2"/>
+          <p:cNvSpPr>
+            <a:spLocks noGrp="1"/>
+          </p:cNvSpPr>
+          <p:nvPr>
+            <p:ph type="body" idx="1"/>
+          </p:nvPr>
+        </p:nvSpPr>
+        <p:spPr/>
+        <p:txBody>
+          <a:bodyPr/>
+          <a:lstStyle/>
+          <a:p>
+            <a:r>
+              <a:rPr lang="en-US" dirty="0"/>
+              <a:t>W are precisions (inverse variances)</a:t>
+            </a:r>
+          </a:p>
+          <a:p>
+            <a:r>
+              <a:rPr lang="en-US" dirty="0"/>
+              <a:t>If we knew the variances exactly, we </a:t>
+            </a:r>
+            <a:r>
+              <a:rPr lang="en-US" dirty="0" err="1"/>
+              <a:t>oculd</a:t>
+            </a:r>
+            <a:r>
+              <a:rPr lang="en-US" dirty="0"/>
+              <a:t> just plug into the formula. Otherwise estimate from data and use the shrinkage estimate, which will do better than the individual mean.</a:t>
+            </a:r>
+          </a:p>
+          <a:p>
+            <a:r>
+              <a:rPr lang="en-US" dirty="0"/>
+              <a:t>Do better means….smaller RMSE??</a:t>
+            </a:r>
+          </a:p>
+        </p:txBody>
+      </p:sp>
+      <p:sp>
+        <p:nvSpPr>
+          <p:cNvPr id="4" name="Slide Number Placeholder 3"/>
+          <p:cNvSpPr>
+            <a:spLocks noGrp="1"/>
+          </p:cNvSpPr>
+          <p:nvPr>
+            <p:ph type="sldNum" sz="quarter" idx="10"/>
+          </p:nvPr>
+        </p:nvSpPr>
+        <p:spPr/>
+        <p:txBody>
+          <a:bodyPr/>
+          <a:lstStyle/>
+          <a:p>
+            <a:fld id="{DCDC1745-AA19-4253-83E6-9EAE9D7EFFC9}" type="slidenum">
+              <a:rPr lang="en-US" smtClean="0"/>
+              <a:t>18</a:t>
+            </a:fld>
+            <a:endParaRPr lang="en-US"/>
+          </a:p>
+        </p:txBody>
+      </p:sp>
+    </p:spTree>
+    <p:extLst>
+      <p:ext uri="{BB962C8B-B14F-4D97-AF65-F5344CB8AC3E}">
+        <p14:creationId xmlns:p14="http://schemas.microsoft.com/office/powerpoint/2010/main" val="4221792328"/>
+      </p:ext>
+    </p:extLst>
+  </p:cSld>
+  <p:clrMapOvr>
+    <a:masterClrMapping/>
+  </p:clrMapOvr>
+</p:notes>
+</file>
+
+<file path=ppt/notesSlides/notesSlide2.xml><?xml version="1.0" encoding="utf-8"?>
+<p:notes xmlns:a="http://schemas.openxmlformats.org/drawingml/2006/main" xmlns:r="http://schemas.openxmlformats.org/officeDocument/2006/relationships" xmlns:p="http://schemas.openxmlformats.org/presentationml/2006/main">
+  <p:cSld>
+    <p:spTree>
+      <p:nvGrpSpPr>
+        <p:cNvPr id="1" name=""/>
+        <p:cNvGrpSpPr/>
+        <p:nvPr/>
+      </p:nvGrpSpPr>
+      <p:grpSpPr>
+        <a:xfrm>
+          <a:off x="0" y="0"/>
+          <a:ext cx="0" cy="0"/>
+          <a:chOff x="0" y="0"/>
+          <a:chExt cx="0" cy="0"/>
+        </a:xfrm>
+      </p:grpSpPr>
+      <p:sp>
+        <p:nvSpPr>
+          <p:cNvPr id="2" name="Slide Image Placeholder 1"/>
+          <p:cNvSpPr>
+            <a:spLocks noGrp="1" noRot="1" noChangeAspect="1"/>
+          </p:cNvSpPr>
+          <p:nvPr>
+            <p:ph type="sldImg"/>
+          </p:nvPr>
+        </p:nvSpPr>
+        <p:spPr/>
+      </p:sp>
+      <p:sp>
+        <p:nvSpPr>
+          <p:cNvPr id="3" name="Notes Placeholder 2"/>
+          <p:cNvSpPr>
+            <a:spLocks noGrp="1"/>
+          </p:cNvSpPr>
+          <p:nvPr>
+            <p:ph type="body" idx="1"/>
+          </p:nvPr>
+        </p:nvSpPr>
+        <p:spPr/>
+        <p:txBody>
+          <a:bodyPr/>
+          <a:lstStyle/>
+          <a:p>
+            <a:endParaRPr lang="en-US" dirty="0"/>
+          </a:p>
+        </p:txBody>
+      </p:sp>
+      <p:sp>
+        <p:nvSpPr>
+          <p:cNvPr id="4" name="Slide Number Placeholder 3"/>
+          <p:cNvSpPr>
+            <a:spLocks noGrp="1"/>
+          </p:cNvSpPr>
+          <p:nvPr>
+            <p:ph type="sldNum" sz="quarter" idx="10"/>
+          </p:nvPr>
+        </p:nvSpPr>
+        <p:spPr/>
+        <p:txBody>
+          <a:bodyPr/>
+          <a:lstStyle/>
+          <a:p>
+            <a:fld id="{DCDC1745-AA19-4253-83E6-9EAE9D7EFFC9}" type="slidenum">
+              <a:rPr lang="en-US" smtClean="0"/>
+              <a:t>2</a:t>
+            </a:fld>
+            <a:endParaRPr lang="en-US"/>
+          </a:p>
+        </p:txBody>
+      </p:sp>
+    </p:spTree>
+    <p:extLst>
+      <p:ext uri="{BB962C8B-B14F-4D97-AF65-F5344CB8AC3E}">
+        <p14:creationId xmlns:p14="http://schemas.microsoft.com/office/powerpoint/2010/main" val="3543592501"/>
+      </p:ext>
+    </p:extLst>
+  </p:cSld>
+  <p:clrMapOvr>
+    <a:masterClrMapping/>
+  </p:clrMapOvr>
+</p:notes>
+</file>
+
+<file path=ppt/notesSlides/notesSlide3.xml><?xml version="1.0" encoding="utf-8"?>
+<p:notes xmlns:a="http://schemas.openxmlformats.org/drawingml/2006/main" xmlns:r="http://schemas.openxmlformats.org/officeDocument/2006/relationships" xmlns:p="http://schemas.openxmlformats.org/presentationml/2006/main">
+  <p:cSld>
+    <p:spTree>
+      <p:nvGrpSpPr>
+        <p:cNvPr id="1" name=""/>
+        <p:cNvGrpSpPr/>
+        <p:nvPr/>
+      </p:nvGrpSpPr>
+      <p:grpSpPr>
+        <a:xfrm>
+          <a:off x="0" y="0"/>
+          <a:ext cx="0" cy="0"/>
+          <a:chOff x="0" y="0"/>
+          <a:chExt cx="0" cy="0"/>
+        </a:xfrm>
+      </p:grpSpPr>
+      <p:sp>
+        <p:nvSpPr>
+          <p:cNvPr id="2" name="Slide Image Placeholder 1"/>
+          <p:cNvSpPr>
+            <a:spLocks noGrp="1" noRot="1" noChangeAspect="1"/>
+          </p:cNvSpPr>
+          <p:nvPr>
+            <p:ph type="sldImg"/>
+          </p:nvPr>
+        </p:nvSpPr>
+        <p:spPr/>
+      </p:sp>
+      <p:sp>
+        <p:nvSpPr>
+          <p:cNvPr id="3" name="Notes Placeholder 2"/>
+          <p:cNvSpPr>
+            <a:spLocks noGrp="1"/>
+          </p:cNvSpPr>
+          <p:nvPr>
+            <p:ph type="body" idx="1"/>
+          </p:nvPr>
+        </p:nvSpPr>
+        <p:spPr/>
+        <p:txBody>
+          <a:bodyPr/>
+          <a:lstStyle/>
+          <a:p>
+            <a:r>
+              <a:rPr lang="en-US" dirty="0"/>
+              <a:t>Intuition for conditional probability? Factorizing into a smaller set (factor a process into smaller pieces)</a:t>
+            </a:r>
+          </a:p>
+          <a:p>
+            <a:pPr marL="228600" indent="-228600">
+              <a:buAutoNum type="arabicPeriod"/>
+            </a:pPr>
+            <a:r>
+              <a:rPr lang="en-US" dirty="0"/>
+              <a:t>Small pieces to big thing</a:t>
+            </a:r>
+          </a:p>
+          <a:p>
+            <a:pPr marL="228600" indent="-228600">
+              <a:buAutoNum type="arabicPeriod"/>
+            </a:pPr>
+            <a:r>
+              <a:rPr lang="en-US" dirty="0"/>
+              <a:t>Big thing to small pieces</a:t>
+            </a:r>
+          </a:p>
+          <a:p>
+            <a:pPr marL="0" indent="0">
+              <a:buNone/>
+            </a:pPr>
+            <a:endParaRPr lang="en-US" dirty="0"/>
+          </a:p>
+          <a:p>
+            <a:pPr marL="0" indent="0">
+              <a:buNone/>
+            </a:pPr>
+            <a:r>
+              <a:rPr lang="en-US" dirty="0"/>
+              <a:t>If we only care about one variable, we can just integrate out the other variables</a:t>
+            </a:r>
+          </a:p>
+          <a:p>
+            <a:r>
+              <a:rPr lang="en-US" dirty="0" err="1"/>
+              <a:t>Pr</a:t>
+            </a:r>
+            <a:r>
+              <a:rPr lang="en-US" dirty="0"/>
+              <a:t>(X,Y)</a:t>
+            </a:r>
+            <a:r>
+              <a:rPr lang="en-US" dirty="0" err="1"/>
+              <a:t>dX</a:t>
+            </a:r>
+            <a:r>
+              <a:rPr lang="en-US" dirty="0"/>
+              <a:t> = </a:t>
+            </a:r>
+            <a:r>
+              <a:rPr lang="en-US" dirty="0" err="1"/>
+              <a:t>Pr</a:t>
+            </a:r>
+            <a:r>
+              <a:rPr lang="en-US" dirty="0"/>
+              <a:t>(Y|X)</a:t>
+            </a:r>
+            <a:r>
+              <a:rPr lang="en-US" dirty="0" err="1"/>
+              <a:t>Pr</a:t>
+            </a:r>
+            <a:r>
+              <a:rPr lang="en-US" dirty="0"/>
+              <a:t>(X)</a:t>
+            </a:r>
+            <a:r>
+              <a:rPr lang="en-US" dirty="0" err="1"/>
+              <a:t>dX</a:t>
+            </a:r>
+            <a:endParaRPr lang="en-US" dirty="0"/>
+          </a:p>
+        </p:txBody>
+      </p:sp>
+      <p:sp>
+        <p:nvSpPr>
+          <p:cNvPr id="4" name="Slide Number Placeholder 3"/>
+          <p:cNvSpPr>
+            <a:spLocks noGrp="1"/>
+          </p:cNvSpPr>
+          <p:nvPr>
+            <p:ph type="sldNum" sz="quarter" idx="10"/>
+          </p:nvPr>
+        </p:nvSpPr>
+        <p:spPr/>
+        <p:txBody>
+          <a:bodyPr/>
+          <a:lstStyle/>
+          <a:p>
+            <a:fld id="{DCDC1745-AA19-4253-83E6-9EAE9D7EFFC9}" type="slidenum">
+              <a:rPr lang="en-US" smtClean="0"/>
+              <a:t>3</a:t>
+            </a:fld>
+            <a:endParaRPr lang="en-US"/>
+          </a:p>
+        </p:txBody>
+      </p:sp>
+    </p:spTree>
+    <p:extLst>
+      <p:ext uri="{BB962C8B-B14F-4D97-AF65-F5344CB8AC3E}">
+        <p14:creationId xmlns:p14="http://schemas.microsoft.com/office/powerpoint/2010/main" val="914123653"/>
+      </p:ext>
+    </p:extLst>
+  </p:cSld>
+  <p:clrMapOvr>
+    <a:masterClrMapping/>
+  </p:clrMapOvr>
+</p:notes>
+</file>
+
+<file path=ppt/notesSlides/notesSlide4.xml><?xml version="1.0" encoding="utf-8"?>
+<p:notes xmlns:a="http://schemas.openxmlformats.org/drawingml/2006/main" xmlns:r="http://schemas.openxmlformats.org/officeDocument/2006/relationships" xmlns:p="http://schemas.openxmlformats.org/presentationml/2006/main">
+  <p:cSld>
+    <p:spTree>
+      <p:nvGrpSpPr>
+        <p:cNvPr id="1" name=""/>
+        <p:cNvGrpSpPr/>
+        <p:nvPr/>
+      </p:nvGrpSpPr>
+      <p:grpSpPr>
+        <a:xfrm>
+          <a:off x="0" y="0"/>
+          <a:ext cx="0" cy="0"/>
+          <a:chOff x="0" y="0"/>
+          <a:chExt cx="0" cy="0"/>
+        </a:xfrm>
+      </p:grpSpPr>
+      <p:sp>
+        <p:nvSpPr>
+          <p:cNvPr id="2" name="Slide Image Placeholder 1"/>
+          <p:cNvSpPr>
+            <a:spLocks noGrp="1" noRot="1" noChangeAspect="1"/>
+          </p:cNvSpPr>
+          <p:nvPr>
+            <p:ph type="sldImg"/>
+          </p:nvPr>
+        </p:nvSpPr>
+        <p:spPr/>
+      </p:sp>
+      <p:sp>
+        <p:nvSpPr>
+          <p:cNvPr id="3" name="Notes Placeholder 2"/>
+          <p:cNvSpPr>
+            <a:spLocks noGrp="1"/>
+          </p:cNvSpPr>
+          <p:nvPr>
+            <p:ph type="body" idx="1"/>
+          </p:nvPr>
+        </p:nvSpPr>
+        <p:spPr/>
+        <p:txBody>
+          <a:bodyPr/>
+          <a:lstStyle/>
+          <a:p>
+            <a:r>
+              <a:rPr lang="en-US" dirty="0"/>
+              <a:t>Consistency of correct model matters for simulation studies (because realistically we never have the correct model)</a:t>
+            </a:r>
+          </a:p>
+        </p:txBody>
+      </p:sp>
+      <p:sp>
+        <p:nvSpPr>
+          <p:cNvPr id="4" name="Slide Number Placeholder 3"/>
+          <p:cNvSpPr>
+            <a:spLocks noGrp="1"/>
+          </p:cNvSpPr>
+          <p:nvPr>
+            <p:ph type="sldNum" sz="quarter" idx="10"/>
+          </p:nvPr>
+        </p:nvSpPr>
+        <p:spPr/>
+        <p:txBody>
+          <a:bodyPr/>
+          <a:lstStyle/>
+          <a:p>
+            <a:fld id="{DCDC1745-AA19-4253-83E6-9EAE9D7EFFC9}" type="slidenum">
+              <a:rPr lang="en-US" smtClean="0"/>
+              <a:t>4</a:t>
+            </a:fld>
+            <a:endParaRPr lang="en-US"/>
+          </a:p>
+        </p:txBody>
+      </p:sp>
+    </p:spTree>
+    <p:extLst>
+      <p:ext uri="{BB962C8B-B14F-4D97-AF65-F5344CB8AC3E}">
+        <p14:creationId xmlns:p14="http://schemas.microsoft.com/office/powerpoint/2010/main" val="3272279355"/>
+      </p:ext>
+    </p:extLst>
+  </p:cSld>
+  <p:clrMapOvr>
+    <a:masterClrMapping/>
+  </p:clrMapOvr>
+</p:notes>
+</file>
+
+<file path=ppt/notesSlides/notesSlide5.xml><?xml version="1.0" encoding="utf-8"?>
+<p:notes xmlns:a="http://schemas.openxmlformats.org/drawingml/2006/main" xmlns:r="http://schemas.openxmlformats.org/officeDocument/2006/relationships" xmlns:p="http://schemas.openxmlformats.org/presentationml/2006/main">
+  <p:cSld>
+    <p:spTree>
+      <p:nvGrpSpPr>
+        <p:cNvPr id="1" name=""/>
+        <p:cNvGrpSpPr/>
+        <p:nvPr/>
+      </p:nvGrpSpPr>
+      <p:grpSpPr>
+        <a:xfrm>
+          <a:off x="0" y="0"/>
+          <a:ext cx="0" cy="0"/>
+          <a:chOff x="0" y="0"/>
+          <a:chExt cx="0" cy="0"/>
+        </a:xfrm>
+      </p:grpSpPr>
+      <p:sp>
+        <p:nvSpPr>
+          <p:cNvPr id="2" name="Slide Image Placeholder 1"/>
+          <p:cNvSpPr>
+            <a:spLocks noGrp="1" noRot="1" noChangeAspect="1"/>
+          </p:cNvSpPr>
+          <p:nvPr>
+            <p:ph type="sldImg"/>
+          </p:nvPr>
+        </p:nvSpPr>
+        <p:spPr/>
+      </p:sp>
+      <p:sp>
+        <p:nvSpPr>
+          <p:cNvPr id="3" name="Notes Placeholder 2"/>
+          <p:cNvSpPr>
+            <a:spLocks noGrp="1"/>
+          </p:cNvSpPr>
+          <p:nvPr>
+            <p:ph type="body" idx="1"/>
+          </p:nvPr>
+        </p:nvSpPr>
+        <p:spPr/>
+        <p:txBody>
+          <a:bodyPr/>
+          <a:lstStyle/>
+          <a:p>
+            <a:r>
+              <a:rPr lang="en-US" dirty="0"/>
+              <a:t>Issue is breaking the “events” down. Not just P(occupied) but P(occupied in 1980 | occupied in 2011)</a:t>
+            </a:r>
+          </a:p>
+          <a:p>
+            <a:r>
+              <a:rPr lang="en-US" dirty="0"/>
+              <a:t>Word problems to factor joint probability distributions into conditional probabilities</a:t>
+            </a:r>
+          </a:p>
+        </p:txBody>
+      </p:sp>
+      <p:sp>
+        <p:nvSpPr>
+          <p:cNvPr id="4" name="Slide Number Placeholder 3"/>
+          <p:cNvSpPr>
+            <a:spLocks noGrp="1"/>
+          </p:cNvSpPr>
+          <p:nvPr>
+            <p:ph type="sldNum" sz="quarter" idx="10"/>
+          </p:nvPr>
+        </p:nvSpPr>
+        <p:spPr/>
+        <p:txBody>
+          <a:bodyPr/>
+          <a:lstStyle/>
+          <a:p>
+            <a:fld id="{DCDC1745-AA19-4253-83E6-9EAE9D7EFFC9}" type="slidenum">
+              <a:rPr lang="en-US" smtClean="0"/>
+              <a:t>5</a:t>
+            </a:fld>
+            <a:endParaRPr lang="en-US"/>
+          </a:p>
+        </p:txBody>
+      </p:sp>
+    </p:spTree>
+    <p:extLst>
+      <p:ext uri="{BB962C8B-B14F-4D97-AF65-F5344CB8AC3E}">
+        <p14:creationId xmlns:p14="http://schemas.microsoft.com/office/powerpoint/2010/main" val="1440149768"/>
+      </p:ext>
+    </p:extLst>
+  </p:cSld>
+  <p:clrMapOvr>
+    <a:masterClrMapping/>
+  </p:clrMapOvr>
+</p:notes>
+</file>
+
+<file path=ppt/notesSlides/notesSlide6.xml><?xml version="1.0" encoding="utf-8"?>
+<p:notes xmlns:a="http://schemas.openxmlformats.org/drawingml/2006/main" xmlns:r="http://schemas.openxmlformats.org/officeDocument/2006/relationships" xmlns:p="http://schemas.openxmlformats.org/presentationml/2006/main">
+  <p:cSld>
+    <p:spTree>
+      <p:nvGrpSpPr>
+        <p:cNvPr id="1" name=""/>
+        <p:cNvGrpSpPr/>
+        <p:nvPr/>
+      </p:nvGrpSpPr>
+      <p:grpSpPr>
+        <a:xfrm>
+          <a:off x="0" y="0"/>
+          <a:ext cx="0" cy="0"/>
+          <a:chOff x="0" y="0"/>
+          <a:chExt cx="0" cy="0"/>
+        </a:xfrm>
+      </p:grpSpPr>
+      <p:sp>
+        <p:nvSpPr>
+          <p:cNvPr id="2" name="Slide Image Placeholder 1"/>
+          <p:cNvSpPr>
+            <a:spLocks noGrp="1" noRot="1" noChangeAspect="1"/>
+          </p:cNvSpPr>
+          <p:nvPr>
+            <p:ph type="sldImg"/>
+          </p:nvPr>
+        </p:nvSpPr>
+        <p:spPr/>
+      </p:sp>
+      <p:sp>
+        <p:nvSpPr>
+          <p:cNvPr id="3" name="Notes Placeholder 2"/>
+          <p:cNvSpPr>
+            <a:spLocks noGrp="1"/>
+          </p:cNvSpPr>
+          <p:nvPr>
+            <p:ph type="body" idx="1"/>
+          </p:nvPr>
+        </p:nvSpPr>
+        <p:spPr/>
+        <p:txBody>
+          <a:bodyPr/>
+          <a:lstStyle/>
+          <a:p>
+            <a:r>
+              <a:rPr lang="en-US" dirty="0"/>
+              <a:t>Add random effects/augmented data so we can make statements about joint probabilities</a:t>
+            </a:r>
+          </a:p>
+          <a:p>
+            <a:endParaRPr lang="en-US" dirty="0"/>
+          </a:p>
+        </p:txBody>
+      </p:sp>
+      <p:sp>
+        <p:nvSpPr>
+          <p:cNvPr id="4" name="Slide Number Placeholder 3"/>
+          <p:cNvSpPr>
+            <a:spLocks noGrp="1"/>
+          </p:cNvSpPr>
+          <p:nvPr>
+            <p:ph type="sldNum" sz="quarter" idx="10"/>
+          </p:nvPr>
+        </p:nvSpPr>
+        <p:spPr/>
+        <p:txBody>
+          <a:bodyPr/>
+          <a:lstStyle/>
+          <a:p>
+            <a:fld id="{DCDC1745-AA19-4253-83E6-9EAE9D7EFFC9}" type="slidenum">
+              <a:rPr lang="en-US" smtClean="0"/>
+              <a:t>6</a:t>
+            </a:fld>
+            <a:endParaRPr lang="en-US"/>
+          </a:p>
+        </p:txBody>
+      </p:sp>
+    </p:spTree>
+    <p:extLst>
+      <p:ext uri="{BB962C8B-B14F-4D97-AF65-F5344CB8AC3E}">
+        <p14:creationId xmlns:p14="http://schemas.microsoft.com/office/powerpoint/2010/main" val="588919105"/>
+      </p:ext>
+    </p:extLst>
+  </p:cSld>
+  <p:clrMapOvr>
+    <a:masterClrMapping/>
+  </p:clrMapOvr>
+</p:notes>
+</file>
+
+<file path=ppt/notesSlides/notesSlide7.xml><?xml version="1.0" encoding="utf-8"?>
+<p:notes xmlns:a="http://schemas.openxmlformats.org/drawingml/2006/main" xmlns:r="http://schemas.openxmlformats.org/officeDocument/2006/relationships" xmlns:p="http://schemas.openxmlformats.org/presentationml/2006/main">
+  <p:cSld>
+    <p:spTree>
+      <p:nvGrpSpPr>
+        <p:cNvPr id="1" name=""/>
+        <p:cNvGrpSpPr/>
+        <p:nvPr/>
+      </p:nvGrpSpPr>
+      <p:grpSpPr>
+        <a:xfrm>
+          <a:off x="0" y="0"/>
+          <a:ext cx="0" cy="0"/>
+          <a:chOff x="0" y="0"/>
+          <a:chExt cx="0" cy="0"/>
+        </a:xfrm>
+      </p:grpSpPr>
+      <p:sp>
+        <p:nvSpPr>
+          <p:cNvPr id="2" name="Slide Image Placeholder 1"/>
+          <p:cNvSpPr>
+            <a:spLocks noGrp="1" noRot="1" noChangeAspect="1"/>
+          </p:cNvSpPr>
+          <p:nvPr>
+            <p:ph type="sldImg"/>
+          </p:nvPr>
+        </p:nvSpPr>
+        <p:spPr/>
+      </p:sp>
+      <p:sp>
+        <p:nvSpPr>
+          <p:cNvPr id="3" name="Notes Placeholder 2"/>
+          <p:cNvSpPr>
+            <a:spLocks noGrp="1"/>
+          </p:cNvSpPr>
+          <p:nvPr>
+            <p:ph type="body" idx="1"/>
+          </p:nvPr>
+        </p:nvSpPr>
+        <p:spPr/>
+        <p:txBody>
+          <a:bodyPr/>
+          <a:lstStyle/>
+          <a:p>
+            <a:r>
+              <a:rPr lang="en-US" dirty="0"/>
+              <a:t>Hierarchical model == mixed effects model</a:t>
+            </a:r>
+          </a:p>
+        </p:txBody>
+      </p:sp>
+      <p:sp>
+        <p:nvSpPr>
+          <p:cNvPr id="4" name="Slide Number Placeholder 3"/>
+          <p:cNvSpPr>
+            <a:spLocks noGrp="1"/>
+          </p:cNvSpPr>
+          <p:nvPr>
+            <p:ph type="sldNum" sz="quarter" idx="10"/>
+          </p:nvPr>
+        </p:nvSpPr>
+        <p:spPr/>
+        <p:txBody>
+          <a:bodyPr/>
+          <a:lstStyle/>
+          <a:p>
+            <a:fld id="{DCDC1745-AA19-4253-83E6-9EAE9D7EFFC9}" type="slidenum">
+              <a:rPr lang="en-US" smtClean="0"/>
+              <a:t>8</a:t>
+            </a:fld>
+            <a:endParaRPr lang="en-US"/>
+          </a:p>
+        </p:txBody>
+      </p:sp>
+    </p:spTree>
+    <p:extLst>
+      <p:ext uri="{BB962C8B-B14F-4D97-AF65-F5344CB8AC3E}">
+        <p14:creationId xmlns:p14="http://schemas.microsoft.com/office/powerpoint/2010/main" val="92538893"/>
+      </p:ext>
+    </p:extLst>
+  </p:cSld>
+  <p:clrMapOvr>
+    <a:masterClrMapping/>
+  </p:clrMapOvr>
+</p:notes>
+</file>
+
+<file path=ppt/notesSlides/notesSlide8.xml><?xml version="1.0" encoding="utf-8"?>
+<p:notes xmlns:a="http://schemas.openxmlformats.org/drawingml/2006/main" xmlns:r="http://schemas.openxmlformats.org/officeDocument/2006/relationships" xmlns:p="http://schemas.openxmlformats.org/presentationml/2006/main">
+  <p:cSld>
+    <p:spTree>
+      <p:nvGrpSpPr>
+        <p:cNvPr id="1" name=""/>
+        <p:cNvGrpSpPr/>
+        <p:nvPr/>
+      </p:nvGrpSpPr>
+      <p:grpSpPr>
+        <a:xfrm>
+          <a:off x="0" y="0"/>
+          <a:ext cx="0" cy="0"/>
+          <a:chOff x="0" y="0"/>
+          <a:chExt cx="0" cy="0"/>
+        </a:xfrm>
+      </p:grpSpPr>
+      <p:sp>
+        <p:nvSpPr>
+          <p:cNvPr id="2" name="Slide Image Placeholder 1"/>
+          <p:cNvSpPr>
+            <a:spLocks noGrp="1" noRot="1" noChangeAspect="1"/>
+          </p:cNvSpPr>
+          <p:nvPr>
+            <p:ph type="sldImg"/>
+          </p:nvPr>
+        </p:nvSpPr>
+        <p:spPr/>
+      </p:sp>
+      <p:sp>
+        <p:nvSpPr>
+          <p:cNvPr id="3" name="Notes Placeholder 2"/>
+          <p:cNvSpPr>
+            <a:spLocks noGrp="1"/>
+          </p:cNvSpPr>
+          <p:nvPr>
+            <p:ph type="body" idx="1"/>
+          </p:nvPr>
+        </p:nvSpPr>
+        <p:spPr/>
+        <p:txBody>
+          <a:bodyPr/>
+          <a:lstStyle/>
+          <a:p>
+            <a:r>
+              <a:rPr lang="en-US" dirty="0"/>
+              <a:t>Bottom thing called pooling or shrinkage</a:t>
+            </a:r>
+          </a:p>
+        </p:txBody>
+      </p:sp>
+      <p:sp>
+        <p:nvSpPr>
+          <p:cNvPr id="4" name="Slide Number Placeholder 3"/>
+          <p:cNvSpPr>
+            <a:spLocks noGrp="1"/>
+          </p:cNvSpPr>
+          <p:nvPr>
+            <p:ph type="sldNum" sz="quarter" idx="10"/>
+          </p:nvPr>
+        </p:nvSpPr>
+        <p:spPr/>
+        <p:txBody>
+          <a:bodyPr/>
+          <a:lstStyle/>
+          <a:p>
+            <a:fld id="{DCDC1745-AA19-4253-83E6-9EAE9D7EFFC9}" type="slidenum">
+              <a:rPr lang="en-US" smtClean="0"/>
+              <a:t>9</a:t>
+            </a:fld>
+            <a:endParaRPr lang="en-US"/>
+          </a:p>
+        </p:txBody>
+      </p:sp>
+    </p:spTree>
+    <p:extLst>
+      <p:ext uri="{BB962C8B-B14F-4D97-AF65-F5344CB8AC3E}">
+        <p14:creationId xmlns:p14="http://schemas.microsoft.com/office/powerpoint/2010/main" val="2203487323"/>
+      </p:ext>
+    </p:extLst>
+  </p:cSld>
+  <p:clrMapOvr>
+    <a:masterClrMapping/>
+  </p:clrMapOvr>
+</p:notes>
+</file>
+
+<file path=ppt/notesSlides/notesSlide9.xml><?xml version="1.0" encoding="utf-8"?>
+<p:notes xmlns:a="http://schemas.openxmlformats.org/drawingml/2006/main" xmlns:r="http://schemas.openxmlformats.org/officeDocument/2006/relationships" xmlns:p="http://schemas.openxmlformats.org/presentationml/2006/main">
+  <p:cSld>
+    <p:spTree>
+      <p:nvGrpSpPr>
+        <p:cNvPr id="1" name=""/>
+        <p:cNvGrpSpPr/>
+        <p:nvPr/>
+      </p:nvGrpSpPr>
+      <p:grpSpPr>
+        <a:xfrm>
+          <a:off x="0" y="0"/>
+          <a:ext cx="0" cy="0"/>
+          <a:chOff x="0" y="0"/>
+          <a:chExt cx="0" cy="0"/>
+        </a:xfrm>
+      </p:grpSpPr>
+      <p:sp>
+        <p:nvSpPr>
+          <p:cNvPr id="2" name="Slide Image Placeholder 1"/>
+          <p:cNvSpPr>
+            <a:spLocks noGrp="1" noRot="1" noChangeAspect="1"/>
+          </p:cNvSpPr>
+          <p:nvPr>
+            <p:ph type="sldImg"/>
+          </p:nvPr>
+        </p:nvSpPr>
+        <p:spPr/>
+      </p:sp>
+      <p:sp>
+        <p:nvSpPr>
+          <p:cNvPr id="3" name="Notes Placeholder 2"/>
+          <p:cNvSpPr>
+            <a:spLocks noGrp="1"/>
+          </p:cNvSpPr>
+          <p:nvPr>
+            <p:ph type="body" idx="1"/>
+          </p:nvPr>
+        </p:nvSpPr>
+        <p:spPr/>
+        <p:txBody>
+          <a:bodyPr/>
+          <a:lstStyle/>
+          <a:p>
+            <a:r>
+              <a:rPr lang="en-US" dirty="0"/>
+              <a:t>James-Stein is one of the ways that people derived mixed effects model and Shrinkage estimator </a:t>
+            </a:r>
+          </a:p>
+        </p:txBody>
+      </p:sp>
+      <p:sp>
+        <p:nvSpPr>
+          <p:cNvPr id="4" name="Slide Number Placeholder 3"/>
+          <p:cNvSpPr>
+            <a:spLocks noGrp="1"/>
+          </p:cNvSpPr>
+          <p:nvPr>
+            <p:ph type="sldNum" sz="quarter" idx="10"/>
+          </p:nvPr>
+        </p:nvSpPr>
+        <p:spPr/>
+        <p:txBody>
+          <a:bodyPr/>
+          <a:lstStyle/>
+          <a:p>
+            <a:fld id="{DCDC1745-AA19-4253-83E6-9EAE9D7EFFC9}" type="slidenum">
+              <a:rPr lang="en-US" smtClean="0"/>
+              <a:t>11</a:t>
+            </a:fld>
+            <a:endParaRPr lang="en-US"/>
+          </a:p>
+        </p:txBody>
+      </p:sp>
+    </p:spTree>
+    <p:extLst>
+      <p:ext uri="{BB962C8B-B14F-4D97-AF65-F5344CB8AC3E}">
+        <p14:creationId xmlns:p14="http://schemas.microsoft.com/office/powerpoint/2010/main" val="2311420909"/>
+      </p:ext>
+    </p:extLst>
+  </p:cSld>
+  <p:clrMapOvr>
+    <a:masterClrMapping/>
+  </p:clrMapOvr>
+</p:notes>
+</file>
+
 <file path=ppt/slideLayouts/slideLayout1.xml><?xml version="1.0" encoding="utf-8"?>
 <p:sldLayout xmlns:a="http://schemas.openxmlformats.org/drawingml/2006/main" xmlns:r="http://schemas.openxmlformats.org/officeDocument/2006/relationships" xmlns:p="http://schemas.openxmlformats.org/presentationml/2006/main" type="title" preserve="1">
   <p:cSld name="Title Slide">
@@ -521,10 +1918,9 @@
           <a:lstStyle/>
           <a:p>
             <a:r>
-              <a:rPr lang="en-US" smtClean="0"/>
+              <a:rPr lang="en-US"/>
               <a:t>Click to edit Master title style</a:t>
             </a:r>
-            <a:endParaRPr lang="en-US"/>
           </a:p>
         </p:txBody>
       </p:sp>
@@ -642,10 +2038,9 @@
           </a:lstStyle>
           <a:p>
             <a:r>
-              <a:rPr lang="en-US" dirty="0" smtClean="0"/>
+              <a:rPr lang="en-US" dirty="0"/>
               <a:t>Click to edit Master subtitle style</a:t>
             </a:r>
-            <a:endParaRPr lang="en-US" dirty="0"/>
           </a:p>
         </p:txBody>
       </p:sp>
@@ -706,13 +2101,6 @@
   <p:clrMapOvr>
     <a:masterClrMapping/>
   </p:clrMapOvr>
-  <p:timing>
-    <p:tnLst>
-      <p:par>
-        <p:cTn id="1" dur="indefinite" restart="never" nodeType="tmRoot"/>
-      </p:par>
-    </p:tnLst>
-  </p:timing>
 </p:sldLayout>
 </file>
 
@@ -749,10 +2137,9 @@
           <a:lstStyle/>
           <a:p>
             <a:r>
-              <a:rPr lang="en-US" smtClean="0"/>
+              <a:rPr lang="en-US"/>
               <a:t>Click to edit Master title style</a:t>
             </a:r>
-            <a:endParaRPr lang="en-US"/>
           </a:p>
         </p:txBody>
       </p:sp>
@@ -773,38 +2160,37 @@
           <a:p>
             <a:pPr lvl="0"/>
             <a:r>
-              <a:rPr lang="en-US" smtClean="0"/>
+              <a:rPr lang="en-US"/>
               <a:t>Click to edit Master text styles</a:t>
             </a:r>
           </a:p>
           <a:p>
             <a:pPr lvl="1"/>
             <a:r>
-              <a:rPr lang="en-US" smtClean="0"/>
+              <a:rPr lang="en-US"/>
               <a:t>Second level</a:t>
             </a:r>
           </a:p>
           <a:p>
             <a:pPr lvl="2"/>
             <a:r>
-              <a:rPr lang="en-US" smtClean="0"/>
+              <a:rPr lang="en-US"/>
               <a:t>Third level</a:t>
             </a:r>
           </a:p>
           <a:p>
             <a:pPr lvl="3"/>
             <a:r>
-              <a:rPr lang="en-US" smtClean="0"/>
+              <a:rPr lang="en-US"/>
               <a:t>Fourth level</a:t>
             </a:r>
           </a:p>
           <a:p>
             <a:pPr lvl="4"/>
             <a:r>
-              <a:rPr lang="en-US" smtClean="0"/>
+              <a:rPr lang="en-US"/>
               <a:t>Fifth level</a:t>
             </a:r>
-            <a:endParaRPr lang="en-US"/>
           </a:p>
         </p:txBody>
       </p:sp>
@@ -843,10 +2229,9 @@
           <a:lstStyle/>
           <a:p>
             <a:r>
-              <a:rPr lang="en-US" smtClean="0"/>
+              <a:rPr lang="en-US"/>
               <a:t>James Thorson (Feb. 28, 2010)</a:t>
             </a:r>
-            <a:endParaRPr lang="en-US"/>
           </a:p>
         </p:txBody>
       </p:sp>
@@ -925,10 +2310,9 @@
           <a:lstStyle/>
           <a:p>
             <a:r>
-              <a:rPr lang="en-US" smtClean="0"/>
+              <a:rPr lang="en-US"/>
               <a:t>Click to edit Master title style</a:t>
             </a:r>
-            <a:endParaRPr lang="en-US"/>
           </a:p>
         </p:txBody>
       </p:sp>
@@ -954,38 +2338,37 @@
           <a:p>
             <a:pPr lvl="0"/>
             <a:r>
-              <a:rPr lang="en-US" smtClean="0"/>
+              <a:rPr lang="en-US"/>
               <a:t>Click to edit Master text styles</a:t>
             </a:r>
           </a:p>
           <a:p>
             <a:pPr lvl="1"/>
             <a:r>
-              <a:rPr lang="en-US" smtClean="0"/>
+              <a:rPr lang="en-US"/>
               <a:t>Second level</a:t>
             </a:r>
           </a:p>
           <a:p>
             <a:pPr lvl="2"/>
             <a:r>
-              <a:rPr lang="en-US" smtClean="0"/>
+              <a:rPr lang="en-US"/>
               <a:t>Third level</a:t>
             </a:r>
           </a:p>
           <a:p>
             <a:pPr lvl="3"/>
             <a:r>
-              <a:rPr lang="en-US" smtClean="0"/>
+              <a:rPr lang="en-US"/>
               <a:t>Fourth level</a:t>
             </a:r>
           </a:p>
           <a:p>
             <a:pPr lvl="4"/>
             <a:r>
-              <a:rPr lang="en-US" smtClean="0"/>
+              <a:rPr lang="en-US"/>
               <a:t>Fifth level</a:t>
             </a:r>
-            <a:endParaRPr lang="en-US"/>
           </a:p>
         </p:txBody>
       </p:sp>
@@ -1024,10 +2407,9 @@
           <a:lstStyle/>
           <a:p>
             <a:r>
-              <a:rPr lang="en-US" smtClean="0"/>
+              <a:rPr lang="en-US"/>
               <a:t>James Thorson (Feb. 28, 2010)</a:t>
             </a:r>
-            <a:endParaRPr lang="en-US"/>
           </a:p>
         </p:txBody>
       </p:sp>
@@ -1114,10 +2496,9 @@
           </a:lstStyle>
           <a:p>
             <a:r>
-              <a:rPr lang="en-US" dirty="0" smtClean="0"/>
+              <a:rPr lang="en-US" dirty="0"/>
               <a:t>Introduction to linear models</a:t>
             </a:r>
-            <a:endParaRPr lang="en-US" dirty="0"/>
           </a:p>
         </p:txBody>
       </p:sp>
@@ -1191,38 +2572,37 @@
           <a:p>
             <a:pPr lvl="0"/>
             <a:r>
-              <a:rPr lang="en-US" dirty="0" smtClean="0"/>
+              <a:rPr lang="en-US" dirty="0"/>
               <a:t>Click to edit Master text styles</a:t>
             </a:r>
           </a:p>
           <a:p>
             <a:pPr lvl="1"/>
             <a:r>
-              <a:rPr lang="en-US" dirty="0" smtClean="0"/>
+              <a:rPr lang="en-US" dirty="0"/>
               <a:t>Second level</a:t>
             </a:r>
           </a:p>
           <a:p>
             <a:pPr lvl="2"/>
             <a:r>
-              <a:rPr lang="en-US" dirty="0" smtClean="0"/>
+              <a:rPr lang="en-US" dirty="0"/>
               <a:t>Third level</a:t>
             </a:r>
           </a:p>
           <a:p>
             <a:pPr lvl="3"/>
             <a:r>
-              <a:rPr lang="en-US" dirty="0" smtClean="0"/>
+              <a:rPr lang="en-US" dirty="0"/>
               <a:t>Fourth level</a:t>
             </a:r>
           </a:p>
           <a:p>
             <a:pPr lvl="4"/>
             <a:r>
-              <a:rPr lang="en-US" dirty="0" smtClean="0"/>
+              <a:rPr lang="en-US" dirty="0"/>
               <a:t>Fifth level</a:t>
             </a:r>
-            <a:endParaRPr lang="en-US" dirty="0"/>
           </a:p>
         </p:txBody>
       </p:sp>
@@ -1271,13 +2651,6 @@
   <p:clrMapOvr>
     <a:masterClrMapping/>
   </p:clrMapOvr>
-  <p:timing>
-    <p:tnLst>
-      <p:par>
-        <p:cTn id="1" dur="indefinite" restart="never" nodeType="tmRoot"/>
-      </p:par>
-    </p:tnLst>
-  </p:timing>
 </p:sldLayout>
 </file>
 
@@ -1327,10 +2700,9 @@
           </a:lstStyle>
           <a:p>
             <a:r>
-              <a:rPr lang="en-US" dirty="0" smtClean="0"/>
+              <a:rPr lang="en-US" dirty="0"/>
               <a:t>Click to edit Master title style</a:t>
             </a:r>
-            <a:endParaRPr lang="en-US" dirty="0"/>
           </a:p>
         </p:txBody>
       </p:sp>
@@ -1384,38 +2756,37 @@
           <a:p>
             <a:pPr lvl="0"/>
             <a:r>
-              <a:rPr lang="en-US" dirty="0" smtClean="0"/>
+              <a:rPr lang="en-US" dirty="0"/>
               <a:t>Click to edit Master text styles</a:t>
             </a:r>
           </a:p>
           <a:p>
             <a:pPr lvl="1"/>
             <a:r>
-              <a:rPr lang="en-US" dirty="0" smtClean="0"/>
+              <a:rPr lang="en-US" dirty="0"/>
               <a:t>Second level</a:t>
             </a:r>
           </a:p>
           <a:p>
             <a:pPr lvl="2"/>
             <a:r>
-              <a:rPr lang="en-US" dirty="0" smtClean="0"/>
+              <a:rPr lang="en-US" dirty="0"/>
               <a:t>Third level</a:t>
             </a:r>
           </a:p>
           <a:p>
             <a:pPr lvl="3"/>
             <a:r>
-              <a:rPr lang="en-US" dirty="0" smtClean="0"/>
+              <a:rPr lang="en-US" dirty="0"/>
               <a:t>Fourth level</a:t>
             </a:r>
           </a:p>
           <a:p>
             <a:pPr lvl="4"/>
             <a:r>
-              <a:rPr lang="en-US" dirty="0" smtClean="0"/>
+              <a:rPr lang="en-US" dirty="0"/>
               <a:t>Fifth level</a:t>
             </a:r>
-            <a:endParaRPr lang="en-US" dirty="0"/>
           </a:p>
         </p:txBody>
       </p:sp>
@@ -1469,38 +2840,37 @@
           <a:p>
             <a:pPr lvl="0"/>
             <a:r>
-              <a:rPr lang="en-US" dirty="0" smtClean="0"/>
+              <a:rPr lang="en-US" dirty="0"/>
               <a:t>Click to edit Master text styles</a:t>
             </a:r>
           </a:p>
           <a:p>
             <a:pPr lvl="1"/>
             <a:r>
-              <a:rPr lang="en-US" dirty="0" smtClean="0"/>
+              <a:rPr lang="en-US" dirty="0"/>
               <a:t>Second level</a:t>
             </a:r>
           </a:p>
           <a:p>
             <a:pPr lvl="2"/>
             <a:r>
-              <a:rPr lang="en-US" dirty="0" smtClean="0"/>
+              <a:rPr lang="en-US" dirty="0"/>
               <a:t>Third level</a:t>
             </a:r>
           </a:p>
           <a:p>
             <a:pPr lvl="3"/>
             <a:r>
-              <a:rPr lang="en-US" dirty="0" smtClean="0"/>
+              <a:rPr lang="en-US" dirty="0"/>
               <a:t>Fourth level</a:t>
             </a:r>
           </a:p>
           <a:p>
             <a:pPr lvl="4"/>
             <a:r>
-              <a:rPr lang="en-US" dirty="0" smtClean="0"/>
+              <a:rPr lang="en-US" dirty="0"/>
               <a:t>Fifth level</a:t>
             </a:r>
-            <a:endParaRPr lang="en-US" dirty="0"/>
           </a:p>
         </p:txBody>
       </p:sp>
@@ -1594,10 +2964,9 @@
           </a:lstStyle>
           <a:p>
             <a:r>
-              <a:rPr lang="en-US" smtClean="0"/>
+              <a:rPr lang="en-US"/>
               <a:t>Click to edit Master title style</a:t>
             </a:r>
-            <a:endParaRPr lang="en-US"/>
           </a:p>
         </p:txBody>
       </p:sp>
@@ -1714,7 +3083,7 @@
           <a:p>
             <a:pPr lvl="0"/>
             <a:r>
-              <a:rPr lang="en-US" smtClean="0"/>
+              <a:rPr lang="en-US"/>
               <a:t>Click to edit Master text styles</a:t>
             </a:r>
           </a:p>
@@ -1755,10 +3124,9 @@
           <a:lstStyle/>
           <a:p>
             <a:r>
-              <a:rPr lang="en-US" smtClean="0"/>
+              <a:rPr lang="en-US"/>
               <a:t>James Thorson (Feb. 28, 2010)</a:t>
             </a:r>
-            <a:endParaRPr lang="en-US"/>
           </a:p>
         </p:txBody>
       </p:sp>
@@ -1845,10 +3213,9 @@
           </a:lstStyle>
           <a:p>
             <a:r>
-              <a:rPr lang="en-US" dirty="0" smtClean="0"/>
+              <a:rPr lang="en-US" dirty="0"/>
               <a:t>Click to edit Master title style</a:t>
             </a:r>
-            <a:endParaRPr lang="en-US" dirty="0"/>
           </a:p>
         </p:txBody>
       </p:sp>
@@ -1919,7 +3286,7 @@
           <a:p>
             <a:pPr lvl="0"/>
             <a:r>
-              <a:rPr lang="en-US" dirty="0" smtClean="0"/>
+              <a:rPr lang="en-US" dirty="0"/>
               <a:t>Click to edit Master text styles</a:t>
             </a:r>
           </a:p>
@@ -1990,38 +3357,37 @@
           <a:p>
             <a:pPr lvl="0"/>
             <a:r>
-              <a:rPr lang="en-US" dirty="0" smtClean="0"/>
+              <a:rPr lang="en-US" dirty="0"/>
               <a:t>Click to edit Master text styles</a:t>
             </a:r>
           </a:p>
           <a:p>
             <a:pPr lvl="1"/>
             <a:r>
-              <a:rPr lang="en-US" dirty="0" smtClean="0"/>
+              <a:rPr lang="en-US" dirty="0"/>
               <a:t>Second level</a:t>
             </a:r>
           </a:p>
           <a:p>
             <a:pPr lvl="2"/>
             <a:r>
-              <a:rPr lang="en-US" dirty="0" smtClean="0"/>
+              <a:rPr lang="en-US" dirty="0"/>
               <a:t>Third level</a:t>
             </a:r>
           </a:p>
           <a:p>
             <a:pPr lvl="3"/>
             <a:r>
-              <a:rPr lang="en-US" dirty="0" smtClean="0"/>
+              <a:rPr lang="en-US" dirty="0"/>
               <a:t>Fourth level</a:t>
             </a:r>
           </a:p>
           <a:p>
             <a:pPr lvl="4"/>
             <a:r>
-              <a:rPr lang="en-US" dirty="0" smtClean="0"/>
+              <a:rPr lang="en-US" dirty="0"/>
               <a:t>Fifth level</a:t>
             </a:r>
-            <a:endParaRPr lang="en-US" dirty="0"/>
           </a:p>
         </p:txBody>
       </p:sp>
@@ -2064,10 +3430,9 @@
           </a:lstStyle>
           <a:p>
             <a:r>
-              <a:rPr lang="en-US" dirty="0" smtClean="0"/>
+              <a:rPr lang="en-US" dirty="0"/>
               <a:t>James Thorson (Feb. 28, 2010)</a:t>
             </a:r>
-            <a:endParaRPr lang="en-US" dirty="0"/>
           </a:p>
         </p:txBody>
       </p:sp>
@@ -2180,10 +3545,9 @@
           <a:lstStyle/>
           <a:p>
             <a:r>
-              <a:rPr lang="en-US" smtClean="0"/>
+              <a:rPr lang="en-US"/>
               <a:t>Click to edit Master title style</a:t>
             </a:r>
-            <a:endParaRPr lang="en-US"/>
           </a:p>
         </p:txBody>
       </p:sp>
@@ -2222,10 +3586,9 @@
           <a:lstStyle/>
           <a:p>
             <a:r>
-              <a:rPr lang="en-US" smtClean="0"/>
+              <a:rPr lang="en-US"/>
               <a:t>James Thorson (Feb. 28, 2010)</a:t>
             </a:r>
-            <a:endParaRPr lang="en-US"/>
           </a:p>
         </p:txBody>
       </p:sp>
@@ -2318,10 +3681,9 @@
           <a:lstStyle/>
           <a:p>
             <a:r>
-              <a:rPr lang="en-US" smtClean="0"/>
+              <a:rPr lang="en-US"/>
               <a:t>James Thorson (Feb. 28, 2010)</a:t>
             </a:r>
-            <a:endParaRPr lang="en-US"/>
           </a:p>
         </p:txBody>
       </p:sp>
@@ -2404,10 +3766,9 @@
           </a:lstStyle>
           <a:p>
             <a:r>
-              <a:rPr lang="en-US" smtClean="0"/>
+              <a:rPr lang="en-US"/>
               <a:t>Click to edit Master title style</a:t>
             </a:r>
-            <a:endParaRPr lang="en-US"/>
           </a:p>
         </p:txBody>
       </p:sp>
@@ -2461,38 +3822,37 @@
           <a:p>
             <a:pPr lvl="0"/>
             <a:r>
-              <a:rPr lang="en-US" smtClean="0"/>
+              <a:rPr lang="en-US"/>
               <a:t>Click to edit Master text styles</a:t>
             </a:r>
           </a:p>
           <a:p>
             <a:pPr lvl="1"/>
             <a:r>
-              <a:rPr lang="en-US" smtClean="0"/>
+              <a:rPr lang="en-US"/>
               <a:t>Second level</a:t>
             </a:r>
           </a:p>
           <a:p>
             <a:pPr lvl="2"/>
             <a:r>
-              <a:rPr lang="en-US" smtClean="0"/>
+              <a:rPr lang="en-US"/>
               <a:t>Third level</a:t>
             </a:r>
           </a:p>
           <a:p>
             <a:pPr lvl="3"/>
             <a:r>
-              <a:rPr lang="en-US" smtClean="0"/>
+              <a:rPr lang="en-US"/>
               <a:t>Fourth level</a:t>
             </a:r>
           </a:p>
           <a:p>
             <a:pPr lvl="4"/>
             <a:r>
-              <a:rPr lang="en-US" smtClean="0"/>
+              <a:rPr lang="en-US"/>
               <a:t>Fifth level</a:t>
             </a:r>
-            <a:endParaRPr lang="en-US"/>
           </a:p>
         </p:txBody>
       </p:sp>
@@ -2555,7 +3915,7 @@
           <a:p>
             <a:pPr lvl="0"/>
             <a:r>
-              <a:rPr lang="en-US" smtClean="0"/>
+              <a:rPr lang="en-US"/>
               <a:t>Click to edit Master text styles</a:t>
             </a:r>
           </a:p>
@@ -2596,10 +3956,9 @@
           <a:lstStyle/>
           <a:p>
             <a:r>
-              <a:rPr lang="en-US" smtClean="0"/>
+              <a:rPr lang="en-US"/>
               <a:t>James Thorson (Feb. 28, 2010)</a:t>
             </a:r>
-            <a:endParaRPr lang="en-US"/>
           </a:p>
         </p:txBody>
       </p:sp>
@@ -2682,10 +4041,9 @@
           </a:lstStyle>
           <a:p>
             <a:r>
-              <a:rPr lang="en-US" smtClean="0"/>
+              <a:rPr lang="en-US"/>
               <a:t>Click to edit Master title style</a:t>
             </a:r>
-            <a:endParaRPr lang="en-US"/>
           </a:p>
         </p:txBody>
       </p:sp>
@@ -2809,7 +4167,7 @@
           <a:p>
             <a:pPr lvl="0"/>
             <a:r>
-              <a:rPr lang="en-US" smtClean="0"/>
+              <a:rPr lang="en-US"/>
               <a:t>Click to edit Master text styles</a:t>
             </a:r>
           </a:p>
@@ -2850,10 +4208,9 @@
           <a:lstStyle/>
           <a:p>
             <a:r>
-              <a:rPr lang="en-US" smtClean="0"/>
+              <a:rPr lang="en-US"/>
               <a:t>James Thorson (Feb. 28, 2010)</a:t>
             </a:r>
-            <a:endParaRPr lang="en-US"/>
           </a:p>
         </p:txBody>
       </p:sp>
@@ -2947,10 +4304,9 @@
           <a:lstStyle/>
           <a:p>
             <a:r>
-              <a:rPr lang="en-US" smtClean="0"/>
+              <a:rPr lang="en-US"/>
               <a:t>Click to edit Master title style</a:t>
             </a:r>
-            <a:endParaRPr lang="en-US"/>
           </a:p>
         </p:txBody>
       </p:sp>
@@ -2981,38 +4337,37 @@
           <a:p>
             <a:pPr lvl="0"/>
             <a:r>
-              <a:rPr lang="en-US" smtClean="0"/>
+              <a:rPr lang="en-US"/>
               <a:t>Click to edit Master text styles</a:t>
             </a:r>
           </a:p>
           <a:p>
             <a:pPr lvl="1"/>
             <a:r>
-              <a:rPr lang="en-US" smtClean="0"/>
+              <a:rPr lang="en-US"/>
               <a:t>Second level</a:t>
             </a:r>
           </a:p>
           <a:p>
             <a:pPr lvl="2"/>
             <a:r>
-              <a:rPr lang="en-US" smtClean="0"/>
+              <a:rPr lang="en-US"/>
               <a:t>Third level</a:t>
             </a:r>
           </a:p>
           <a:p>
             <a:pPr lvl="3"/>
             <a:r>
-              <a:rPr lang="en-US" smtClean="0"/>
+              <a:rPr lang="en-US"/>
               <a:t>Fourth level</a:t>
             </a:r>
           </a:p>
           <a:p>
             <a:pPr lvl="4"/>
             <a:r>
-              <a:rPr lang="en-US" smtClean="0"/>
+              <a:rPr lang="en-US"/>
               <a:t>Fifth level</a:t>
             </a:r>
-            <a:endParaRPr lang="en-US"/>
           </a:p>
         </p:txBody>
       </p:sp>
@@ -3087,10 +4442,9 @@
           </a:lstStyle>
           <a:p>
             <a:r>
-              <a:rPr lang="en-US" smtClean="0"/>
+              <a:rPr lang="en-US"/>
               <a:t>James Thorson (Feb. 28, 2010)</a:t>
             </a:r>
-            <a:endParaRPr lang="en-US"/>
           </a:p>
         </p:txBody>
       </p:sp>
@@ -3157,13 +4511,6 @@
     <p:sldLayoutId id="2147483682" r:id="rId10"/>
     <p:sldLayoutId id="2147483683" r:id="rId11"/>
   </p:sldLayoutIdLst>
-  <p:timing>
-    <p:tnLst>
-      <p:par>
-        <p:cTn id="1" dur="indefinite" restart="never" nodeType="tmRoot"/>
-      </p:par>
-    </p:tnLst>
-  </p:timing>
   <p:hf hdr="0" ftr="0" dt="0"/>
   <p:txStyles>
     <p:titleStyle>
@@ -3451,10 +4798,9 @@
           <a:lstStyle/>
           <a:p>
             <a:r>
-              <a:rPr lang="en-US" dirty="0" smtClean="0"/>
+              <a:rPr lang="en-US" dirty="0"/>
               <a:t>Lecture 2:  Mixed-effects models</a:t>
             </a:r>
-            <a:endParaRPr lang="en-US" dirty="0"/>
           </a:p>
         </p:txBody>
       </p:sp>
@@ -3474,7 +4820,7 @@
           <a:lstStyle/>
           <a:p>
             <a:r>
-              <a:rPr lang="en-US" smtClean="0"/>
+              <a:rPr lang="en-US"/>
               <a:t>April 3, 2018</a:t>
             </a:r>
             <a:endParaRPr lang="en-US" dirty="0"/>
@@ -3515,13 +4861,6 @@
   <p:clrMapOvr>
     <a:masterClrMapping/>
   </p:clrMapOvr>
-  <p:timing>
-    <p:tnLst>
-      <p:par>
-        <p:cTn id="1" dur="indefinite" restart="never" nodeType="tmRoot"/>
-      </p:par>
-    </p:tnLst>
-  </p:timing>
 </p:sld>
 </file>
 
@@ -3585,32 +4924,27 @@
                   <a:buNone/>
                 </a:pPr>
                 <a:r>
-                  <a:rPr lang="en-US" sz="3200" b="1" dirty="0" smtClean="0"/>
-                  <a:t>Stein’s </a:t>
-                </a:r>
-                <a:r>
                   <a:rPr lang="en-US" sz="3200" b="1" dirty="0"/>
-                  <a:t>paradox </a:t>
+                  <a:t>Stein’s paradox </a:t>
                 </a:r>
               </a:p>
               <a:p>
                 <a:r>
-                  <a:rPr lang="en-US" dirty="0" smtClean="0"/>
+                  <a:rPr lang="en-US" dirty="0"/>
                   <a:t>Why is this a paradox?</a:t>
                 </a:r>
               </a:p>
               <a:p>
                 <a:pPr lvl="1"/>
                 <a:r>
-                  <a:rPr lang="en-US" dirty="0" smtClean="0"/>
+                  <a:rPr lang="en-US" dirty="0"/>
                   <a:t>No reference to things being pooled!</a:t>
                 </a:r>
-                <a:endParaRPr lang="en-US" dirty="0"/>
               </a:p>
               <a:p>
                 <a:pPr lvl="1" indent="-342900"/>
                 <a:r>
-                  <a:rPr lang="en-US" dirty="0" smtClean="0"/>
+                  <a:rPr lang="en-US" dirty="0"/>
                   <a:t>Say we have three batters, and the proportion of Japanese-made cars</a:t>
                 </a:r>
               </a:p>
@@ -3628,11 +4962,7 @@
                 </a14:m>
                 <a:r>
                   <a:rPr lang="en-US" dirty="0"/>
-                  <a:t>: </a:t>
-                </a:r>
-                <a:r>
-                  <a:rPr lang="en-US" dirty="0" smtClean="0"/>
-                  <a:t>Batting and car-sales averages (</a:t>
+                  <a:t>: Batting and car-sales averages (</a:t>
                 </a:r>
                 <a14:m>
                   <m:oMath xmlns:m="http://schemas.openxmlformats.org/officeDocument/2006/math">
@@ -3690,7 +5020,7 @@
                   </m:oMath>
                 </a14:m>
                 <a:r>
-                  <a:rPr lang="en-US" dirty="0" smtClean="0"/>
+                  <a:rPr lang="en-US" dirty="0"/>
                   <a:t>)</a:t>
                 </a:r>
               </a:p>
@@ -3707,7 +5037,7 @@
                   </m:oMath>
                 </a14:m>
                 <a:r>
-                  <a:rPr lang="en-US" dirty="0" smtClean="0"/>
+                  <a:rPr lang="en-US" dirty="0"/>
                   <a:t>:  Best prediction of future probability of hit</a:t>
                 </a:r>
               </a:p>
@@ -3795,12 +5125,12 @@
                     </m:oMath>
                   </m:oMathPara>
                 </a14:m>
-                <a:endParaRPr lang="en-US" b="1" dirty="0" smtClean="0"/>
+                <a:endParaRPr lang="en-US" b="1" dirty="0"/>
               </a:p>
               <a:p>
                 <a:pPr lvl="3" indent="-342900"/>
                 <a:r>
-                  <a:rPr lang="en-US" dirty="0" smtClean="0"/>
+                  <a:rPr lang="en-US" dirty="0"/>
                   <a:t>Where </a:t>
                 </a:r>
                 <a14:m>
@@ -3814,7 +5144,7 @@
                   </m:oMath>
                 </a14:m>
                 <a:r>
-                  <a:rPr lang="en-US" dirty="0" smtClean="0"/>
+                  <a:rPr lang="en-US" dirty="0"/>
                   <a:t> is the magnitude of shrinkage, </a:t>
                 </a:r>
                 <a14:m>
@@ -3839,12 +5169,12 @@
                     </m:r>
                   </m:oMath>
                 </a14:m>
-                <a:endParaRPr lang="en-US" dirty="0" smtClean="0"/>
+                <a:endParaRPr lang="en-US" dirty="0"/>
               </a:p>
               <a:p>
                 <a:pPr lvl="1" indent="-342900"/>
                 <a:r>
-                  <a:rPr lang="en-US" dirty="0" smtClean="0"/>
+                  <a:rPr lang="en-US" dirty="0"/>
                   <a:t>Works regardless of definition of </a:t>
                 </a:r>
                 <a14:m>
@@ -3857,12 +5187,12 @@
                     </m:r>
                   </m:oMath>
                 </a14:m>
-                <a:endParaRPr lang="en-US" dirty="0" smtClean="0"/>
+                <a:endParaRPr lang="en-US" dirty="0"/>
               </a:p>
               <a:p>
                 <a:pPr lvl="2" indent="-342900"/>
                 <a:r>
-                  <a:rPr lang="en-US" dirty="0" smtClean="0"/>
+                  <a:rPr lang="en-US" dirty="0"/>
                   <a:t>Contamination leads to lower shrinkage on average, </a:t>
                 </a:r>
                 <a14:m>
@@ -3889,7 +5219,7 @@
                     </m:r>
                   </m:oMath>
                 </a14:m>
-                <a:endParaRPr lang="en-US" dirty="0" smtClean="0"/>
+                <a:endParaRPr lang="en-US" dirty="0"/>
               </a:p>
             </p:txBody>
           </p:sp>
@@ -3938,13 +5268,6 @@
   <p:clrMapOvr>
     <a:masterClrMapping/>
   </p:clrMapOvr>
-  <p:timing>
-    <p:tnLst>
-      <p:par>
-        <p:cTn id="1" dur="indefinite" restart="never" nodeType="tmRoot"/>
-      </p:par>
-    </p:tnLst>
-  </p:timing>
 </p:sld>
 </file>
 
@@ -4008,18 +5331,18 @@
                   <a:buNone/>
                 </a:pPr>
                 <a:r>
-                  <a:rPr lang="en-US" b="1" dirty="0" smtClean="0"/>
+                  <a:rPr lang="en-US" b="1" dirty="0"/>
                   <a:t>Predicting random variables</a:t>
                 </a:r>
               </a:p>
               <a:p>
                 <a:pPr lvl="1"/>
                 <a:r>
-                  <a:rPr lang="en-US" i="1" dirty="0" smtClean="0"/>
+                  <a:rPr lang="en-US" i="1" dirty="0"/>
                   <a:t>Empirical Bayes – </a:t>
                 </a:r>
                 <a:r>
-                  <a:rPr lang="en-US" dirty="0" smtClean="0"/>
+                  <a:rPr lang="en-US" dirty="0"/>
                   <a:t>Predict random variables </a:t>
                 </a:r>
                 <a14:m>
@@ -4033,7 +5356,7 @@
                   </m:oMath>
                 </a14:m>
                 <a:r>
-                  <a:rPr lang="en-US" dirty="0" smtClean="0"/>
+                  <a:rPr lang="en-US" dirty="0"/>
                   <a:t> using estimated values </a:t>
                 </a:r>
                 <a14:m>
@@ -4061,7 +5384,7 @@
                   </m:oMath>
                 </a14:m>
                 <a:r>
-                  <a:rPr lang="en-US" dirty="0" smtClean="0"/>
+                  <a:rPr lang="en-US" dirty="0"/>
                   <a:t> for parameters </a:t>
                 </a:r>
                 <a14:m>
@@ -4075,7 +5398,7 @@
                     </m:r>
                   </m:oMath>
                 </a14:m>
-                <a:endParaRPr lang="en-US" dirty="0" smtClean="0"/>
+                <a:endParaRPr lang="en-US" dirty="0"/>
               </a:p>
               <a:p>
                 <a:pPr marL="457200" lvl="1" indent="0">
@@ -4353,12 +5676,12 @@
                     </m:oMath>
                   </m:oMathPara>
                 </a14:m>
-                <a:endParaRPr lang="en-US" dirty="0" smtClean="0"/>
+                <a:endParaRPr lang="en-US" dirty="0"/>
               </a:p>
               <a:p>
                 <a:pPr lvl="2"/>
                 <a:r>
-                  <a:rPr lang="en-US" dirty="0" smtClean="0"/>
+                  <a:rPr lang="en-US" dirty="0"/>
                   <a:t>Where </a:t>
                 </a:r>
                 <a14:m>
@@ -4386,7 +5709,7 @@
                   </m:oMath>
                 </a14:m>
                 <a:r>
-                  <a:rPr lang="en-US" dirty="0" smtClean="0"/>
+                  <a:rPr lang="en-US" dirty="0"/>
                   <a:t> is the maximum likelihood estimate of fixed effects </a:t>
                 </a:r>
                 <a14:m>
@@ -4400,7 +5723,7 @@
                     </m:r>
                   </m:oMath>
                 </a14:m>
-                <a:endParaRPr lang="en-US" dirty="0" smtClean="0"/>
+                <a:endParaRPr lang="en-US" dirty="0"/>
               </a:p>
               <a:p>
                 <a:pPr marL="457200" lvl="1" indent="0">
@@ -4411,7 +5734,7 @@
               <a:p>
                 <a:pPr lvl="1"/>
                 <a:r>
-                  <a:rPr lang="en-US" dirty="0" smtClean="0"/>
+                  <a:rPr lang="en-US" dirty="0"/>
                   <a:t>Fisheries has historically used “penalized likelihood” (Ludwig and Walters 1981)</a:t>
                 </a:r>
               </a:p>
@@ -4722,15 +6045,15 @@
               <a:p>
                 <a:pPr lvl="1"/>
                 <a:r>
-                  <a:rPr lang="en-US" dirty="0" smtClean="0"/>
+                  <a:rPr lang="en-US" dirty="0"/>
                   <a:t>… but this yields biased estimates of </a:t>
                 </a:r>
                 <a:r>
-                  <a:rPr lang="en-US" dirty="0" err="1" smtClean="0"/>
+                  <a:rPr lang="en-US" dirty="0" err="1"/>
                   <a:t>hyperparameters</a:t>
                 </a:r>
                 <a:r>
-                  <a:rPr lang="en-US" dirty="0" smtClean="0"/>
+                  <a:rPr lang="en-US" dirty="0"/>
                   <a:t> </a:t>
                 </a:r>
                 <a14:m>
@@ -4765,7 +6088,7 @@
                     </m:sSub>
                   </m:oMath>
                 </a14:m>
-                <a:endParaRPr lang="en-US" dirty="0" smtClean="0"/>
+                <a:endParaRPr lang="en-US" dirty="0"/>
               </a:p>
               <a:p>
                 <a:pPr lvl="1"/>
@@ -4773,7 +6096,7 @@
               </a:p>
               <a:p>
                 <a:pPr lvl="1"/>
-                <a:endParaRPr lang="en-US" dirty="0" smtClean="0"/>
+                <a:endParaRPr lang="en-US" dirty="0"/>
               </a:p>
               <a:p>
                 <a:pPr lvl="1"/>
@@ -4802,7 +6125,7 @@
             </p:nvSpPr>
             <p:spPr>
               <a:blipFill>
-                <a:blip r:embed="rId2"/>
+                <a:blip r:embed="rId3"/>
                 <a:stretch>
                   <a:fillRect l="-1424" t="-1026" r="-1017"/>
                 </a:stretch>
@@ -4833,13 +6156,6 @@
   <p:clrMapOvr>
     <a:masterClrMapping/>
   </p:clrMapOvr>
-  <p:timing>
-    <p:tnLst>
-      <p:par>
-        <p:cTn id="1" dur="indefinite" restart="never" nodeType="tmRoot"/>
-      </p:par>
-    </p:tnLst>
-  </p:timing>
 </p:sld>
 </file>
 
@@ -4903,10 +6219,10 @@
                   <a:buNone/>
                 </a:pPr>
                 <a:r>
-                  <a:rPr lang="en-US" sz="3600" b="1" dirty="0" smtClean="0"/>
+                  <a:rPr lang="en-US" sz="3600" b="1" dirty="0"/>
                   <a:t>Estimation</a:t>
                 </a:r>
-                <a:endParaRPr lang="en-US" b="1" dirty="0" smtClean="0"/>
+                <a:endParaRPr lang="en-US" b="1" dirty="0"/>
               </a:p>
               <a:p>
                 <a:pPr marL="0" indent="0">
@@ -5214,14 +6530,14 @@
                     </m:oMath>
                   </m:oMathPara>
                 </a14:m>
-                <a:endParaRPr lang="en-US" sz="2800" dirty="0" smtClean="0"/>
+                <a:endParaRPr lang="en-US" sz="2800" dirty="0"/>
               </a:p>
               <a:p>
                 <a:pPr marL="0" indent="0">
                   <a:buNone/>
                 </a:pPr>
                 <a:r>
-                  <a:rPr lang="en-US" sz="2800" dirty="0" smtClean="0">
+                  <a:rPr lang="en-US" sz="2800" dirty="0">
                     <a:latin typeface="Cambria Math"/>
                   </a:rPr>
                   <a:t>where</a:t>
@@ -5272,14 +6588,14 @@
                   </m:oMath>
                 </a14:m>
                 <a:r>
-                  <a:rPr lang="en-US" dirty="0" smtClean="0"/>
+                  <a:rPr lang="en-US" dirty="0"/>
                   <a:t> is the likelihood</a:t>
                 </a:r>
               </a:p>
               <a:p>
                 <a:pPr lvl="1"/>
                 <a:r>
-                  <a:rPr lang="en-US" dirty="0" err="1" smtClean="0">
+                  <a:rPr lang="en-US" dirty="0" err="1">
                     <a:ea typeface="Cambria Math"/>
                   </a:rPr>
                   <a:t>Pr</a:t>
@@ -5338,7 +6654,7 @@
                   </m:oMath>
                 </a14:m>
                 <a:r>
-                  <a:rPr lang="en-US" dirty="0" smtClean="0"/>
+                  <a:rPr lang="en-US" dirty="0"/>
                   <a:t> is the hyper-distribution</a:t>
                 </a:r>
               </a:p>
@@ -5511,10 +6827,9 @@
                   </m:oMath>
                 </a14:m>
                 <a:r>
-                  <a:rPr lang="en-US" dirty="0" smtClean="0"/>
+                  <a:rPr lang="en-US" dirty="0"/>
                   <a:t>is the “penalized likelihood”</a:t>
                 </a:r>
-                <a:endParaRPr lang="en-US" dirty="0"/>
               </a:p>
             </p:txBody>
           </p:sp>
@@ -5532,7 +6847,7 @@
             </p:nvSpPr>
             <p:spPr>
               <a:blipFill>
-                <a:blip r:embed="rId2"/>
+                <a:blip r:embed="rId3"/>
                 <a:stretch>
                   <a:fillRect l="-2102" t="-1641"/>
                 </a:stretch>
@@ -5563,13 +6878,6 @@
   <p:clrMapOvr>
     <a:masterClrMapping/>
   </p:clrMapOvr>
-  <p:timing>
-    <p:tnLst>
-      <p:par>
-        <p:cTn id="1" dur="indefinite" restart="never" nodeType="tmRoot"/>
-      </p:par>
-    </p:tnLst>
-  </p:timing>
 </p:sld>
 </file>
 
@@ -5628,7 +6936,7 @@
               <a:buNone/>
             </a:pPr>
             <a:r>
-              <a:rPr lang="en-US" dirty="0" smtClean="0"/>
+              <a:rPr lang="en-US" dirty="0"/>
               <a:t>How do we estimate the marginal likelihood?</a:t>
             </a:r>
           </a:p>
@@ -5638,21 +6946,21 @@
               <a:buAutoNum type="arabicPeriod"/>
             </a:pPr>
             <a:r>
-              <a:rPr lang="en-US" dirty="0" smtClean="0"/>
+              <a:rPr lang="en-US" dirty="0"/>
               <a:t>“Hierarchical Bayes”</a:t>
             </a:r>
           </a:p>
           <a:p>
             <a:pPr lvl="1" indent="-342900"/>
             <a:r>
-              <a:rPr lang="en-US" dirty="0" smtClean="0"/>
+              <a:rPr lang="en-US" dirty="0"/>
               <a:t>Generally involves MCMC</a:t>
             </a:r>
           </a:p>
           <a:p>
             <a:pPr lvl="1" indent="-342900"/>
             <a:r>
-              <a:rPr lang="en-US" dirty="0" smtClean="0"/>
+              <a:rPr lang="en-US" dirty="0"/>
               <a:t>Already integrating across parameters, so integrates across latent variables automatically</a:t>
             </a:r>
           </a:p>
@@ -5662,35 +6970,35 @@
               <a:buAutoNum type="arabicPeriod"/>
             </a:pPr>
             <a:r>
-              <a:rPr lang="en-US" dirty="0" smtClean="0"/>
+              <a:rPr lang="en-US" dirty="0"/>
               <a:t>“Maximum marginal likelihood”</a:t>
             </a:r>
           </a:p>
           <a:p>
             <a:pPr lvl="1" indent="-342900"/>
             <a:r>
-              <a:rPr lang="en-US" dirty="0" smtClean="0"/>
+              <a:rPr lang="en-US" dirty="0"/>
               <a:t>Use the “Laplace approximation” to approximate integral</a:t>
             </a:r>
           </a:p>
           <a:p>
             <a:pPr lvl="1" indent="-342900"/>
             <a:r>
-              <a:rPr lang="en-US" dirty="0" smtClean="0"/>
+              <a:rPr lang="en-US" dirty="0"/>
               <a:t>Use alternating estimation of fixed and random effects</a:t>
             </a:r>
           </a:p>
           <a:p>
             <a:pPr lvl="2" indent="-342900"/>
             <a:r>
-              <a:rPr lang="en-US" dirty="0" smtClean="0"/>
+              <a:rPr lang="en-US" dirty="0"/>
               <a:t>“Inner optimization” – Optimize random effects given fixed effects</a:t>
             </a:r>
           </a:p>
           <a:p>
             <a:pPr lvl="2" indent="-342900"/>
             <a:r>
-              <a:rPr lang="en-US" dirty="0" smtClean="0"/>
+              <a:rPr lang="en-US" dirty="0"/>
               <a:t>“Outer optimization” – Optimize fixed effects given random effects</a:t>
             </a:r>
             <a:endParaRPr lang="en-GB" dirty="0"/>
@@ -5707,13 +7015,6 @@
   <p:clrMapOvr>
     <a:masterClrMapping/>
   </p:clrMapOvr>
-  <p:timing>
-    <p:tnLst>
-      <p:par>
-        <p:cTn id="1" dur="indefinite" restart="never" nodeType="tmRoot"/>
-      </p:par>
-    </p:tnLst>
-  </p:timing>
 </p:sld>
 </file>
 
@@ -5756,8 +7057,8 @@
           </a:p>
         </p:txBody>
       </p:sp>
-      <mc:AlternateContent xmlns:mc="http://schemas.openxmlformats.org/markup-compatibility/2006">
-        <mc:Choice xmlns:a14="http://schemas.microsoft.com/office/drawing/2010/main" Requires="a14">
+      <mc:AlternateContent xmlns:mc="http://schemas.openxmlformats.org/markup-compatibility/2006" xmlns:a14="http://schemas.microsoft.com/office/drawing/2010/main">
+        <mc:Choice Requires="a14">
           <p:sp>
             <p:nvSpPr>
               <p:cNvPr id="3" name="Content Placeholder 2"/>
@@ -5779,17 +7080,16 @@
                   <a:buNone/>
                 </a:pPr>
                 <a:r>
-                  <a:rPr lang="en-US" b="1" dirty="0" smtClean="0"/>
+                  <a:rPr lang="en-US" b="1" dirty="0"/>
                   <a:t>Laplace approximation</a:t>
                 </a:r>
               </a:p>
               <a:p>
                 <a:pPr lvl="1"/>
                 <a:r>
-                  <a:rPr lang="en-US" dirty="0" smtClean="0"/>
+                  <a:rPr lang="en-US" dirty="0"/>
                   <a:t>The definition of a marginal likelihood</a:t>
                 </a:r>
-                <a:endParaRPr lang="en-US" dirty="0" smtClean="0"/>
               </a:p>
               <a:p>
                 <a:pPr marL="0" indent="0">
@@ -5923,7 +7223,7 @@
                                 <m:dPr>
                                   <m:ctrlPr>
                                     <a:rPr lang="en-US" i="1">
-                                      <a:latin typeface="Cambria Math"/>
+                                      <a:latin typeface="Cambria Math" panose="02040503050406030204" pitchFamily="18" charset="0"/>
                                       <a:ea typeface="Cambria Math"/>
                                     </a:rPr>
                                   </m:ctrlPr>
@@ -5982,7 +7282,7 @@
                     </m:oMath>
                   </m:oMathPara>
                 </a14:m>
-                <a:endParaRPr lang="en-US" i="1" dirty="0" smtClean="0">
+                <a:endParaRPr lang="en-US" i="1" dirty="0">
                   <a:latin typeface="Cambria Math" panose="02040503050406030204" pitchFamily="18" charset="0"/>
                   <a:ea typeface="Cambria Math"/>
                 </a:endParaRPr>
@@ -5990,20 +7290,20 @@
               <a:p>
                 <a:pPr lvl="1"/>
                 <a:r>
-                  <a:rPr lang="en-US" dirty="0" smtClean="0">
+                  <a:rPr lang="en-US" dirty="0">
                     <a:latin typeface="Cambria Math" panose="02040503050406030204" pitchFamily="18" charset="0"/>
                     <a:ea typeface="Cambria Math"/>
                   </a:rPr>
                   <a:t>The Laplace approximation can be used to approximate </a:t>
                 </a:r>
                 <a:r>
-                  <a:rPr lang="en-US" smtClean="0">
+                  <a:rPr lang="en-US">
                     <a:latin typeface="Cambria Math" panose="02040503050406030204" pitchFamily="18" charset="0"/>
                     <a:ea typeface="Cambria Math"/>
                   </a:rPr>
                   <a:t>this integral</a:t>
                 </a:r>
-                <a:endParaRPr lang="en-US" dirty="0" smtClean="0">
+                <a:endParaRPr lang="en-US" dirty="0">
                   <a:latin typeface="Cambria Math" panose="02040503050406030204" pitchFamily="18" charset="0"/>
                   <a:ea typeface="Cambria Math"/>
                 </a:endParaRPr>
@@ -6326,12 +7626,12 @@
                     </m:oMath>
                   </m:oMathPara>
                 </a14:m>
-                <a:endParaRPr lang="en-US" dirty="0" smtClean="0"/>
+                <a:endParaRPr lang="en-US" dirty="0"/>
               </a:p>
               <a:p>
                 <a:pPr lvl="1"/>
                 <a:r>
-                  <a:rPr lang="en-US" dirty="0" smtClean="0"/>
+                  <a:rPr lang="en-US" dirty="0"/>
                   <a:t>Where</a:t>
                 </a:r>
               </a:p>
@@ -6595,12 +7895,12 @@
                     </m:oMath>
                   </m:oMathPara>
                 </a14:m>
-                <a:endParaRPr lang="en-US" dirty="0" smtClean="0"/>
+                <a:endParaRPr lang="en-US" dirty="0"/>
               </a:p>
               <a:p>
                 <a:pPr lvl="1" indent="-342900"/>
                 <a:r>
-                  <a:rPr lang="en-US" dirty="0" smtClean="0"/>
+                  <a:rPr lang="en-US" dirty="0"/>
                   <a:t>And</a:t>
                 </a:r>
               </a:p>
@@ -6804,11 +8104,11 @@
                     </m:oMath>
                   </m:oMathPara>
                 </a14:m>
-                <a:endParaRPr lang="en-US" dirty="0" smtClean="0"/>
+                <a:endParaRPr lang="en-US" dirty="0"/>
               </a:p>
               <a:p>
                 <a:r>
-                  <a:rPr lang="en-US" dirty="0" smtClean="0"/>
+                  <a:rPr lang="en-US" dirty="0"/>
                   <a:t>Definitions</a:t>
                 </a:r>
               </a:p>
@@ -6904,7 +8204,7 @@
                   </m:oMath>
                 </a14:m>
                 <a:r>
-                  <a:rPr lang="en-US" dirty="0" smtClean="0"/>
+                  <a:rPr lang="en-US" dirty="0"/>
                   <a:t> is the marginal log-likelihood</a:t>
                 </a:r>
               </a:p>
@@ -6988,7 +8288,7 @@
                   </m:oMath>
                 </a14:m>
                 <a:r>
-                  <a:rPr lang="en-US" dirty="0" smtClean="0"/>
+                  <a:rPr lang="en-US" dirty="0"/>
                   <a:t> is the joint likelihood</a:t>
                 </a:r>
               </a:p>
@@ -7020,18 +8320,18 @@
                   </m:oMath>
                 </a14:m>
                 <a:r>
-                  <a:rPr lang="en-US" dirty="0" smtClean="0"/>
+                  <a:rPr lang="en-US" dirty="0"/>
                   <a:t> is the determinant of the Hessian matrix</a:t>
                 </a:r>
               </a:p>
               <a:p>
                 <a:pPr lvl="1"/>
-                <a:endParaRPr lang="en-US" dirty="0" smtClean="0"/>
+                <a:endParaRPr lang="en-US" dirty="0"/>
               </a:p>
             </p:txBody>
           </p:sp>
         </mc:Choice>
-        <mc:Fallback>
+        <mc:Fallback xmlns="">
           <p:sp>
             <p:nvSpPr>
               <p:cNvPr id="3" name="Content Placeholder 2"/>
@@ -7044,7 +8344,7 @@
             </p:nvSpPr>
             <p:spPr>
               <a:blipFill>
-                <a:blip r:embed="rId2"/>
+                <a:blip r:embed="rId3"/>
                 <a:stretch>
                   <a:fillRect l="-610" t="-1436"/>
                 </a:stretch>
@@ -7075,13 +8375,6 @@
   <p:clrMapOvr>
     <a:masterClrMapping/>
   </p:clrMapOvr>
-  <p:timing>
-    <p:tnLst>
-      <p:par>
-        <p:cTn id="1" dur="indefinite" restart="never" nodeType="tmRoot"/>
-      </p:par>
-    </p:tnLst>
-  </p:timing>
 </p:sld>
 </file>
 
@@ -7118,10 +8411,9 @@
           <a:lstStyle/>
           <a:p>
             <a:r>
-              <a:rPr lang="en-US" dirty="0" smtClean="0"/>
+              <a:rPr lang="en-US" dirty="0"/>
               <a:t>TMB</a:t>
             </a:r>
-            <a:endParaRPr lang="en-US" dirty="0"/>
           </a:p>
         </p:txBody>
       </p:sp>
@@ -7148,7 +8440,7 @@
                   <a:buNone/>
                 </a:pPr>
                 <a:r>
-                  <a:rPr lang="en-US" b="1" dirty="0" smtClean="0"/>
+                  <a:rPr lang="en-US" b="1" dirty="0"/>
                   <a:t>Steps during optimization</a:t>
                 </a:r>
               </a:p>
@@ -7158,7 +8450,7 @@
                   <a:buAutoNum type="arabicPeriod"/>
                 </a:pPr>
                 <a:r>
-                  <a:rPr lang="en-US" sz="2000" dirty="0" smtClean="0"/>
+                  <a:rPr lang="en-US" sz="2000" dirty="0"/>
                   <a:t>Write joint log-likelihood </a:t>
                 </a:r>
                 <a14:m>
@@ -7239,7 +8531,7 @@
                   </m:oMath>
                 </a14:m>
                 <a:r>
-                  <a:rPr lang="en-US" sz="2000" dirty="0" smtClean="0"/>
+                  <a:rPr lang="en-US" sz="2000" dirty="0"/>
                   <a:t> in CPP file</a:t>
                 </a:r>
               </a:p>
@@ -7492,7 +8784,7 @@
                     </m:oMath>
                   </m:oMathPara>
                 </a14:m>
-                <a:endParaRPr lang="en-US" sz="1800" dirty="0" smtClean="0"/>
+                <a:endParaRPr lang="en-US" sz="1800" dirty="0"/>
               </a:p>
               <a:p>
                 <a:pPr marL="514350" indent="-514350">
@@ -7500,7 +8792,7 @@
                   <a:buAutoNum type="arabicPeriod"/>
                 </a:pPr>
                 <a:r>
-                  <a:rPr lang="en-US" sz="2000" dirty="0" smtClean="0"/>
+                  <a:rPr lang="en-US" sz="2000" dirty="0"/>
                   <a:t>Choose initial values for fixed </a:t>
                 </a:r>
                 <a14:m>
@@ -7536,7 +8828,7 @@
                   </m:oMath>
                 </a14:m>
                 <a:r>
-                  <a:rPr lang="en-US" sz="2000" dirty="0" smtClean="0"/>
+                  <a:rPr lang="en-US" sz="2000" dirty="0"/>
                   <a:t> and random </a:t>
                 </a:r>
                 <a14:m>
@@ -7571,7 +8863,7 @@
                     </m:sSub>
                   </m:oMath>
                 </a14:m>
-                <a:endParaRPr lang="en-US" sz="2000" dirty="0" smtClean="0"/>
+                <a:endParaRPr lang="en-US" sz="2000" dirty="0"/>
               </a:p>
               <a:p>
                 <a:pPr marL="514350" indent="-514350">
@@ -7579,7 +8871,7 @@
                   <a:buAutoNum type="arabicPeriod"/>
                 </a:pPr>
                 <a:r>
-                  <a:rPr lang="en-US" sz="2000" dirty="0" smtClean="0"/>
+                  <a:rPr lang="en-US" sz="2000" dirty="0"/>
                   <a:t>“Inner optimization” – Optimize random effects with </a:t>
                 </a:r>
                 <a14:m>
@@ -7615,7 +8907,7 @@
                   </m:oMath>
                 </a14:m>
                 <a:r>
-                  <a:rPr lang="en-US" sz="2000" dirty="0" smtClean="0"/>
+                  <a:rPr lang="en-US" sz="2000" dirty="0"/>
                   <a:t>held constant</a:t>
                 </a:r>
               </a:p>
@@ -7761,7 +9053,7 @@
                     </m:oMath>
                   </m:oMathPara>
                 </a14:m>
-                <a:endParaRPr lang="en-US" sz="2000" dirty="0" smtClean="0"/>
+                <a:endParaRPr lang="en-US" sz="2000" dirty="0"/>
               </a:p>
               <a:p>
                 <a:pPr marL="514350" indent="-514350">
@@ -7769,7 +9061,7 @@
                   <a:buAutoNum type="arabicPeriod" startAt="4"/>
                 </a:pPr>
                 <a:r>
-                  <a:rPr lang="en-US" sz="2000" dirty="0" smtClean="0"/>
+                  <a:rPr lang="en-US" sz="2000" dirty="0"/>
                   <a:t>Calculate Laplace approx. for marginal likelihood of fixed effects</a:t>
                 </a:r>
               </a:p>
@@ -8052,14 +9344,14 @@
                     </m:oMath>
                   </m:oMathPara>
                 </a14:m>
-                <a:endParaRPr lang="en-US" sz="2000" b="0" dirty="0" smtClean="0">
+                <a:endParaRPr lang="en-US" sz="2000" b="0" dirty="0">
                   <a:ea typeface="Cambria Math"/>
                 </a:endParaRPr>
               </a:p>
               <a:p>
                 <a:pPr lvl="1"/>
                 <a:r>
-                  <a:rPr lang="en-US" sz="1800" dirty="0" smtClean="0"/>
+                  <a:rPr lang="en-US" sz="1800" dirty="0"/>
                   <a:t>TMB also provides the gradient of the penalized likelihood with respect to fixed effects</a:t>
                 </a:r>
               </a:p>
@@ -8069,17 +9361,16 @@
                   <a:buAutoNum type="arabicPeriod" startAt="5"/>
                 </a:pPr>
                 <a:r>
-                  <a:rPr lang="en-US" sz="2000" dirty="0" smtClean="0"/>
+                  <a:rPr lang="en-US" sz="2000" dirty="0"/>
                   <a:t>“Outer optimization” – Repeat steps 2-3</a:t>
                 </a:r>
               </a:p>
               <a:p>
                 <a:pPr lvl="1"/>
                 <a:r>
-                  <a:rPr lang="en-US" sz="1800" dirty="0" smtClean="0"/>
+                  <a:rPr lang="en-US" sz="1800" dirty="0"/>
                   <a:t>Outer optimization is done in R using the function value and gradient provided by TMB</a:t>
                 </a:r>
-                <a:endParaRPr lang="en-US" sz="1800" dirty="0"/>
               </a:p>
             </p:txBody>
           </p:sp>
@@ -8097,7 +9388,7 @@
             </p:nvSpPr>
             <p:spPr>
               <a:blipFill>
-                <a:blip r:embed="rId2"/>
+                <a:blip r:embed="rId3"/>
                 <a:stretch>
                   <a:fillRect l="-1424" t="-1026" r="-339"/>
                 </a:stretch>
@@ -8128,13 +9419,6 @@
   <p:clrMapOvr>
     <a:masterClrMapping/>
   </p:clrMapOvr>
-  <p:timing>
-    <p:tnLst>
-      <p:par>
-        <p:cTn id="1" dur="indefinite" restart="never" nodeType="tmRoot"/>
-      </p:par>
-    </p:tnLst>
-  </p:timing>
 </p:sld>
 </file>
 
@@ -8197,7 +9481,7 @@
                   <a:buNone/>
                 </a:pPr>
                 <a:r>
-                  <a:rPr lang="en-US" sz="3600" dirty="0" smtClean="0"/>
+                  <a:rPr lang="en-US" sz="3600" dirty="0"/>
                   <a:t>Generalized linear mixed model</a:t>
                 </a:r>
               </a:p>
@@ -8207,7 +9491,7 @@
                   <a:buAutoNum type="arabicPeriod"/>
                 </a:pPr>
                 <a:r>
-                  <a:rPr lang="en-US" sz="3200" dirty="0" smtClean="0">
+                  <a:rPr lang="en-US" sz="3200" dirty="0">
                     <a:solidFill>
                       <a:schemeClr val="tx1"/>
                     </a:solidFill>
@@ -8543,7 +9827,7 @@
                     </m:oMath>
                   </m:oMathPara>
                 </a14:m>
-                <a:endParaRPr lang="en-US" sz="2800" dirty="0" smtClean="0">
+                <a:endParaRPr lang="en-US" sz="2800" dirty="0">
                   <a:solidFill>
                     <a:schemeClr val="tx1"/>
                   </a:solidFill>
@@ -8555,7 +9839,7 @@
                   <a:buAutoNum type="arabicPeriod"/>
                 </a:pPr>
                 <a:r>
-                  <a:rPr lang="en-US" sz="3200" dirty="0" smtClean="0">
+                  <a:rPr lang="en-US" sz="3200" dirty="0">
                     <a:solidFill>
                       <a:schemeClr val="tx1"/>
                     </a:solidFill>
@@ -8705,14 +9989,14 @@
               </a:p>
               <a:p>
                 <a:pPr marL="571500" indent="-514350"/>
-                <a:endParaRPr lang="en-US" sz="3600" dirty="0" smtClean="0"/>
+                <a:endParaRPr lang="en-US" sz="3600" dirty="0"/>
               </a:p>
               <a:p>
                 <a:pPr marL="57150" indent="0">
                   <a:buNone/>
                 </a:pPr>
                 <a:r>
-                  <a:rPr lang="en-US" sz="3600" dirty="0" smtClean="0"/>
+                  <a:rPr lang="en-US" sz="3600" dirty="0"/>
                   <a:t>=	General linear model + mixed effect(s)</a:t>
                 </a:r>
               </a:p>
@@ -8763,13 +10047,6 @@
   <p:clrMapOvr>
     <a:masterClrMapping/>
   </p:clrMapOvr>
-  <p:timing>
-    <p:tnLst>
-      <p:par>
-        <p:cTn id="1" dur="indefinite" restart="never" nodeType="tmRoot"/>
-      </p:par>
-    </p:tnLst>
-  </p:timing>
 </p:sld>
 </file>
 
@@ -8832,13 +10109,13 @@
                   <a:buNone/>
                 </a:pPr>
                 <a:r>
-                  <a:rPr lang="en-US" sz="3600" b="1" dirty="0" smtClean="0"/>
+                  <a:rPr lang="en-US" sz="3600" b="1" dirty="0"/>
                   <a:t>Shrinkage</a:t>
                 </a:r>
               </a:p>
               <a:p>
                 <a:r>
-                  <a:rPr lang="en-US" dirty="0" smtClean="0"/>
+                  <a:rPr lang="en-US" dirty="0"/>
                   <a:t>Suppose you have density samples </a:t>
                 </a:r>
                 <a14:m>
@@ -8883,22 +10160,22 @@
                   </m:oMath>
                 </a14:m>
                 <a:r>
-                  <a:rPr lang="en-US" dirty="0" smtClean="0"/>
+                  <a:rPr lang="en-US" dirty="0"/>
                   <a:t> for site </a:t>
                 </a:r>
                 <a:r>
-                  <a:rPr lang="en-US" i="1" dirty="0" smtClean="0"/>
+                  <a:rPr lang="en-US" i="1" dirty="0"/>
                   <a:t>j</a:t>
                 </a:r>
                 <a:r>
-                  <a:rPr lang="en-US" dirty="0" smtClean="0"/>
+                  <a:rPr lang="en-US" dirty="0"/>
                   <a:t> </a:t>
                 </a:r>
               </a:p>
               <a:p>
                 <a:pPr lvl="1"/>
                 <a:r>
-                  <a:rPr lang="en-US" dirty="0" smtClean="0"/>
+                  <a:rPr lang="en-US" dirty="0"/>
                   <a:t>You assume the following model:</a:t>
                 </a:r>
               </a:p>
@@ -9018,7 +10295,7 @@
                     </m:oMath>
                   </m:oMathPara>
                 </a14:m>
-                <a:endParaRPr lang="en-US" b="0" dirty="0" smtClean="0">
+                <a:endParaRPr lang="en-US" b="0" dirty="0">
                   <a:ea typeface="Cambria Math" panose="02040503050406030204" pitchFamily="18" charset="0"/>
                 </a:endParaRPr>
               </a:p>
@@ -9133,12 +10410,12 @@
                     </m:oMath>
                   </m:oMathPara>
                 </a14:m>
-                <a:endParaRPr lang="en-US" dirty="0" smtClean="0"/>
+                <a:endParaRPr lang="en-US" dirty="0"/>
               </a:p>
               <a:p>
                 <a:pPr lvl="1"/>
                 <a:r>
-                  <a:rPr lang="en-US" dirty="0" smtClean="0"/>
+                  <a:rPr lang="en-US" dirty="0"/>
                   <a:t>Three fixed effects (</a:t>
                 </a:r>
                 <a14:m>
@@ -9183,7 +10460,7 @@
                   </m:oMath>
                 </a14:m>
                 <a:r>
-                  <a:rPr lang="en-US" dirty="0" smtClean="0"/>
+                  <a:rPr lang="en-US" dirty="0"/>
                   <a:t>, </a:t>
                 </a:r>
                 <a14:m>
@@ -9228,7 +10505,7 @@
                   </m:oMath>
                 </a14:m>
                 <a:r>
-                  <a:rPr lang="en-US" dirty="0" smtClean="0"/>
+                  <a:rPr lang="en-US" dirty="0"/>
                   <a:t>, and </a:t>
                 </a:r>
                 <a14:m>
@@ -9243,7 +10520,7 @@
                   </m:oMath>
                 </a14:m>
                 <a:r>
-                  <a:rPr lang="en-US" dirty="0" smtClean="0"/>
+                  <a:rPr lang="en-US" dirty="0"/>
                   <a:t>)</a:t>
                 </a:r>
               </a:p>
@@ -9279,7 +10556,7 @@
                   </m:oMath>
                 </a14:m>
                 <a:r>
-                  <a:rPr lang="en-US" dirty="0" smtClean="0"/>
+                  <a:rPr lang="en-US" dirty="0"/>
                   <a:t> random effects (</a:t>
                 </a:r>
                 <a14:m>
@@ -9312,7 +10589,7 @@
                   </m:oMath>
                 </a14:m>
                 <a:r>
-                  <a:rPr lang="en-US" dirty="0" smtClean="0"/>
+                  <a:rPr lang="en-US" dirty="0"/>
                   <a:t>)</a:t>
                 </a:r>
               </a:p>
@@ -9332,7 +10609,7 @@
             </p:nvSpPr>
             <p:spPr>
               <a:blipFill>
-                <a:blip r:embed="rId2"/>
+                <a:blip r:embed="rId3"/>
                 <a:stretch>
                   <a:fillRect l="-2102" t="-1641"/>
                 </a:stretch>
@@ -9363,13 +10640,6 @@
   <p:clrMapOvr>
     <a:masterClrMapping/>
   </p:clrMapOvr>
-  <p:timing>
-    <p:tnLst>
-      <p:par>
-        <p:cTn id="1" dur="indefinite" restart="never" nodeType="tmRoot"/>
-      </p:par>
-    </p:tnLst>
-  </p:timing>
 </p:sld>
 </file>
 
@@ -9432,20 +10702,20 @@
                   <a:buNone/>
                 </a:pPr>
                 <a:r>
-                  <a:rPr lang="en-US" sz="3600" b="1" dirty="0" smtClean="0"/>
+                  <a:rPr lang="en-US" sz="3600" b="1" dirty="0"/>
                   <a:t>Shrinkage</a:t>
                 </a:r>
               </a:p>
               <a:p>
                 <a:r>
-                  <a:rPr lang="en-US" dirty="0" smtClean="0"/>
+                  <a:rPr lang="en-US" dirty="0"/>
                   <a:t>Estimated random effects are weighted average of:</a:t>
                 </a:r>
               </a:p>
               <a:p>
                 <a:pPr lvl="1"/>
                 <a:r>
-                  <a:rPr lang="en-US" dirty="0" smtClean="0"/>
+                  <a:rPr lang="en-US" dirty="0"/>
                   <a:t>Optimal predictor</a:t>
                 </a:r>
               </a:p>
@@ -9590,12 +10860,12 @@
                     </m:oMath>
                   </m:oMathPara>
                 </a14:m>
-                <a:endParaRPr lang="en-US" b="0" dirty="0" smtClean="0"/>
+                <a:endParaRPr lang="en-US" b="0" dirty="0"/>
               </a:p>
               <a:p>
                 <a:pPr lvl="1"/>
                 <a:r>
-                  <a:rPr lang="en-US" dirty="0" smtClean="0"/>
+                  <a:rPr lang="en-US" dirty="0"/>
                   <a:t>Where</a:t>
                 </a:r>
               </a:p>
@@ -9760,7 +11030,7 @@
                     </m:oMath>
                   </m:oMathPara>
                 </a14:m>
-                <a:endParaRPr lang="en-US" b="0" i="1" dirty="0" smtClean="0">
+                <a:endParaRPr lang="en-US" b="0" i="1" dirty="0">
                   <a:latin typeface="Cambria Math" panose="02040503050406030204" pitchFamily="18" charset="0"/>
                 </a:endParaRPr>
               </a:p>
@@ -9875,7 +11145,7 @@
                     </m:oMath>
                   </m:oMathPara>
                 </a14:m>
-                <a:endParaRPr lang="en-US" b="0" i="1" dirty="0" smtClean="0">
+                <a:endParaRPr lang="en-US" b="0" i="1" dirty="0">
                   <a:latin typeface="Cambria Math" panose="02040503050406030204" pitchFamily="18" charset="0"/>
                 </a:endParaRPr>
               </a:p>
@@ -10014,7 +11284,7 @@
               <a:p>
                 <a:pPr lvl="1"/>
                 <a:r>
-                  <a:rPr lang="en-US" dirty="0" smtClean="0"/>
+                  <a:rPr lang="en-US" dirty="0"/>
                   <a:t>And where </a:t>
                 </a:r>
               </a:p>
@@ -10061,7 +11331,7 @@
                   </m:oMath>
                 </a14:m>
                 <a:r>
-                  <a:rPr lang="en-US" dirty="0" smtClean="0"/>
+                  <a:rPr lang="en-US" dirty="0"/>
                   <a:t> is the variance in </a:t>
                 </a:r>
                 <a14:m>
@@ -10094,7 +11364,7 @@
                   </m:oMath>
                 </a14:m>
                 <a:r>
-                  <a:rPr lang="en-US" dirty="0" smtClean="0"/>
+                  <a:rPr lang="en-US" dirty="0"/>
                   <a:t> among groups</a:t>
                 </a:r>
               </a:p>
@@ -10141,7 +11411,7 @@
                   </m:oMath>
                 </a14:m>
                 <a:r>
-                  <a:rPr lang="en-US" dirty="0" smtClean="0"/>
+                  <a:rPr lang="en-US" dirty="0"/>
                   <a:t> is the variance of density samples within a given group</a:t>
                 </a:r>
               </a:p>
@@ -10189,19 +11459,19 @@
                   </m:oMath>
                 </a14:m>
                 <a:r>
-                  <a:rPr lang="en-US" i="1" dirty="0" smtClean="0">
+                  <a:rPr lang="en-US" i="1" dirty="0">
                     <a:latin typeface="Cambria Math" panose="02040503050406030204" pitchFamily="18" charset="0"/>
                   </a:rPr>
                   <a:t> </a:t>
                 </a:r>
                 <a:r>
-                  <a:rPr lang="en-US" dirty="0" smtClean="0">
+                  <a:rPr lang="en-US" dirty="0">
                     <a:latin typeface="Cambria Math" panose="02040503050406030204" pitchFamily="18" charset="0"/>
                   </a:rPr>
                   <a:t>is the sample mean for group </a:t>
                 </a:r>
                 <a:r>
-                  <a:rPr lang="en-US" i="1" dirty="0" smtClean="0">
+                  <a:rPr lang="en-US" i="1" dirty="0">
                     <a:latin typeface="Cambria Math" panose="02040503050406030204" pitchFamily="18" charset="0"/>
                   </a:rPr>
                   <a:t>j</a:t>
@@ -10232,7 +11502,7 @@
                   </m:oMath>
                 </a14:m>
                 <a:r>
-                  <a:rPr lang="en-US" dirty="0" smtClean="0"/>
+                  <a:rPr lang="en-US" dirty="0"/>
                   <a:t> is the sample mean for </a:t>
                 </a:r>
                 <a14:m>
@@ -10277,13 +11547,13 @@
                   </m:oMath>
                 </a14:m>
                 <a:r>
-                  <a:rPr lang="en-US" dirty="0" smtClean="0"/>
+                  <a:rPr lang="en-US" dirty="0"/>
                   <a:t> for all groups</a:t>
                 </a:r>
               </a:p>
               <a:p>
                 <a:pPr lvl="2"/>
-                <a:endParaRPr lang="en-US" dirty="0" smtClean="0"/>
+                <a:endParaRPr lang="en-US" dirty="0"/>
               </a:p>
               <a:p>
                 <a:pPr lvl="2"/>
@@ -10305,7 +11575,7 @@
             </p:nvSpPr>
             <p:spPr>
               <a:blipFill>
-                <a:blip r:embed="rId2"/>
+                <a:blip r:embed="rId3"/>
                 <a:stretch>
                   <a:fillRect l="-1153" t="-1949"/>
                 </a:stretch>
@@ -10393,7 +11663,7 @@
             <a:pPr marL="0" indent="0">
               <a:buNone/>
             </a:pPr>
-            <a:endParaRPr lang="en-US" dirty="0" smtClean="0"/>
+            <a:endParaRPr lang="en-US" dirty="0"/>
           </a:p>
           <a:p>
             <a:pPr marL="0" indent="0">
@@ -10405,7 +11675,7 @@
             <a:pPr marL="0" indent="0">
               <a:buNone/>
             </a:pPr>
-            <a:endParaRPr lang="en-US" dirty="0" smtClean="0"/>
+            <a:endParaRPr lang="en-US" dirty="0"/>
           </a:p>
           <a:p>
             <a:pPr marL="0" indent="0">
@@ -10418,7 +11688,7 @@
               <a:buNone/>
             </a:pPr>
             <a:r>
-              <a:rPr lang="en-US" b="1" dirty="0" smtClean="0"/>
+              <a:rPr lang="en-US" b="1" dirty="0"/>
               <a:t>[Look at code]</a:t>
             </a:r>
             <a:endParaRPr lang="en-GB" b="1" dirty="0"/>
@@ -10471,10 +11741,9 @@
           <a:lstStyle/>
           <a:p>
             <a:r>
-              <a:rPr lang="en-US" dirty="0" smtClean="0"/>
+              <a:rPr lang="en-US" dirty="0"/>
               <a:t>How do we estimate things?</a:t>
             </a:r>
-            <a:endParaRPr lang="en-US" dirty="0"/>
           </a:p>
         </p:txBody>
       </p:sp>
@@ -10729,14 +11998,14 @@
               <a:buAutoNum type="arabicPeriod"/>
             </a:pPr>
             <a:r>
-              <a:rPr lang="en-US" dirty="0" smtClean="0"/>
+              <a:rPr lang="en-US" dirty="0"/>
               <a:t>Specify a model</a:t>
             </a:r>
           </a:p>
           <a:p>
             <a:pPr marL="857250" lvl="1" indent="-457200"/>
             <a:r>
-              <a:rPr lang="en-US" dirty="0" smtClean="0"/>
+              <a:rPr lang="en-US" dirty="0"/>
               <a:t>Function generating predictions</a:t>
             </a:r>
           </a:p>
@@ -10746,14 +12015,14 @@
               <a:buAutoNum type="arabicPeriod"/>
             </a:pPr>
             <a:r>
-              <a:rPr lang="en-US" dirty="0" smtClean="0"/>
+              <a:rPr lang="en-US" dirty="0"/>
               <a:t>Identify plausible values for any unknown parameters</a:t>
             </a:r>
           </a:p>
           <a:p>
             <a:pPr marL="857250" lvl="1" indent="-457200"/>
             <a:r>
-              <a:rPr lang="en-US" dirty="0" smtClean="0"/>
+              <a:rPr lang="en-US" dirty="0"/>
               <a:t>Maximize probability of observations given function</a:t>
             </a:r>
           </a:p>
@@ -10763,14 +12032,14 @@
               <a:buAutoNum type="arabicPeriod"/>
             </a:pPr>
             <a:r>
-              <a:rPr lang="en-US" dirty="0" smtClean="0"/>
+              <a:rPr lang="en-US" dirty="0"/>
               <a:t>Assess uncertainty</a:t>
             </a:r>
           </a:p>
           <a:p>
             <a:pPr marL="857250" lvl="1" indent="-457200"/>
             <a:r>
-              <a:rPr lang="en-US" dirty="0" smtClean="0"/>
+              <a:rPr lang="en-US" dirty="0"/>
               <a:t>Explore function around plausible values</a:t>
             </a:r>
           </a:p>
@@ -11082,7 +12351,7 @@
                   <a:buNone/>
                 </a:pPr>
                 <a:r>
-                  <a:rPr lang="en-US" sz="3200" b="1" dirty="0" smtClean="0"/>
+                  <a:rPr lang="en-US" sz="3200" b="1" dirty="0"/>
                   <a:t>Laws of probability</a:t>
                 </a:r>
               </a:p>
@@ -11092,7 +12361,7 @@
                   <a:buAutoNum type="arabicPeriod"/>
                 </a:pPr>
                 <a:r>
-                  <a:rPr lang="en-US" dirty="0" smtClean="0"/>
+                  <a:rPr lang="en-US" dirty="0"/>
                   <a:t>Axiom of conditional probability</a:t>
                 </a:r>
               </a:p>
@@ -11273,7 +12542,7 @@
               <a:p>
                 <a:pPr lvl="1" indent="-342900"/>
                 <a:r>
-                  <a:rPr lang="en-US" dirty="0" smtClean="0"/>
+                  <a:rPr lang="en-US" dirty="0"/>
                   <a:t>Often easier to specify conditional probabilities than joint probabilities</a:t>
                 </a:r>
               </a:p>
@@ -11282,7 +12551,7 @@
                   <a:buFont typeface="+mj-lt"/>
                   <a:buAutoNum type="arabicPeriod"/>
                 </a:pPr>
-                <a:endParaRPr lang="en-US" dirty="0" smtClean="0"/>
+                <a:endParaRPr lang="en-US" dirty="0"/>
               </a:p>
               <a:p>
                 <a:pPr marL="514350" indent="-514350">
@@ -11290,7 +12559,7 @@
                   <a:buAutoNum type="arabicPeriod"/>
                 </a:pPr>
                 <a:r>
-                  <a:rPr lang="en-US" dirty="0" smtClean="0"/>
+                  <a:rPr lang="en-US" dirty="0"/>
                   <a:t>Law of total probability</a:t>
                 </a:r>
               </a:p>
@@ -11422,15 +12691,14 @@
                     </m:oMath>
                   </m:oMathPara>
                 </a14:m>
-                <a:endParaRPr lang="en-US" dirty="0" smtClean="0"/>
+                <a:endParaRPr lang="en-US" dirty="0"/>
               </a:p>
               <a:p>
                 <a:pPr lvl="1"/>
                 <a:r>
-                  <a:rPr lang="en-US" dirty="0" smtClean="0"/>
+                  <a:rPr lang="en-US" dirty="0"/>
                   <a:t>Used when justifying hierarchical models</a:t>
                 </a:r>
-                <a:endParaRPr lang="en-US" dirty="0"/>
               </a:p>
             </p:txBody>
           </p:sp>
@@ -11448,7 +12716,7 @@
             </p:nvSpPr>
             <p:spPr>
               <a:blipFill>
-                <a:blip r:embed="rId2"/>
+                <a:blip r:embed="rId3"/>
                 <a:stretch>
                   <a:fillRect l="-1763" t="-1333"/>
                 </a:stretch>
@@ -11479,13 +12747,6 @@
   <p:clrMapOvr>
     <a:masterClrMapping/>
   </p:clrMapOvr>
-  <p:timing>
-    <p:tnLst>
-      <p:par>
-        <p:cTn id="1" dur="indefinite" restart="never" nodeType="tmRoot"/>
-      </p:par>
-    </p:tnLst>
-  </p:timing>
 </p:sld>
 </file>
 
@@ -11546,7 +12807,7 @@
                   <a:buNone/>
                 </a:pPr>
                 <a:r>
-                  <a:rPr lang="en-US" dirty="0" smtClean="0"/>
+                  <a:rPr lang="en-US" dirty="0"/>
                   <a:t>Why use maximum likelihood estimation?</a:t>
                 </a:r>
               </a:p>
@@ -11792,14 +13053,14 @@
                 <a:pPr marL="571500" indent="-514350">
                   <a:buAutoNum type="arabicPeriod"/>
                 </a:pPr>
-                <a:endParaRPr lang="en-US" dirty="0" smtClean="0"/>
+                <a:endParaRPr lang="en-US" dirty="0"/>
               </a:p>
               <a:p>
                 <a:pPr marL="571500" indent="-514350">
                   <a:buAutoNum type="arabicPeriod"/>
                 </a:pPr>
                 <a:r>
-                  <a:rPr lang="en-US" dirty="0" smtClean="0"/>
+                  <a:rPr lang="en-US" dirty="0"/>
                   <a:t>Consistency (correct model)</a:t>
                 </a:r>
               </a:p>
@@ -11808,7 +13069,7 @@
                   <a:buAutoNum type="arabicPeriod"/>
                 </a:pPr>
                 <a:r>
-                  <a:rPr lang="en-US" dirty="0" smtClean="0"/>
+                  <a:rPr lang="en-US" dirty="0"/>
                   <a:t>Consistency (incorrect model)</a:t>
                 </a:r>
               </a:p>
@@ -11817,7 +13078,7 @@
                   <a:buAutoNum type="arabicPeriod"/>
                 </a:pPr>
                 <a:r>
-                  <a:rPr lang="en-US" dirty="0" smtClean="0"/>
+                  <a:rPr lang="en-US" dirty="0"/>
                   <a:t>Asymptotic normality</a:t>
                 </a:r>
               </a:p>
@@ -11837,7 +13098,7 @@
             </p:nvSpPr>
             <p:spPr>
               <a:blipFill>
-                <a:blip r:embed="rId2"/>
+                <a:blip r:embed="rId3"/>
                 <a:stretch>
                   <a:fillRect l="-1424" t="-1026"/>
                 </a:stretch>
@@ -12072,7 +13333,7 @@
               <a:buNone/>
             </a:pPr>
             <a:r>
-              <a:rPr lang="en-US" dirty="0" smtClean="0"/>
+              <a:rPr lang="en-US" dirty="0"/>
               <a:t>Problem:</a:t>
             </a:r>
           </a:p>
@@ -12081,7 +13342,7 @@
               <a:buNone/>
             </a:pPr>
             <a:r>
-              <a:rPr lang="en-US" dirty="0" smtClean="0"/>
+              <a:rPr lang="en-US" dirty="0"/>
               <a:t>We often can’t write the probability of data given parameters</a:t>
             </a:r>
           </a:p>
@@ -12090,7 +13351,7 @@
               <a:buNone/>
             </a:pPr>
             <a:r>
-              <a:rPr lang="en-US" dirty="0" smtClean="0"/>
+              <a:rPr lang="en-US" dirty="0"/>
               <a:t>Examples:</a:t>
             </a:r>
           </a:p>
@@ -12100,14 +13361,14 @@
               <a:buAutoNum type="arabicPeriod"/>
             </a:pPr>
             <a:r>
-              <a:rPr lang="en-US" dirty="0" smtClean="0"/>
+              <a:rPr lang="en-US" dirty="0"/>
               <a:t>Tag-recapture</a:t>
             </a:r>
           </a:p>
           <a:p>
             <a:pPr lvl="2" indent="-342900"/>
             <a:r>
-              <a:rPr lang="en-US" dirty="0" smtClean="0"/>
+              <a:rPr lang="en-US" dirty="0"/>
               <a:t>What’s the probability of tagging an animal in 2008, seeing it again in 2010 and 2011, and then never seeing it again?</a:t>
             </a:r>
           </a:p>
@@ -12117,14 +13378,14 @@
               <a:buAutoNum type="arabicPeriod"/>
             </a:pPr>
             <a:r>
-              <a:rPr lang="en-US" dirty="0" smtClean="0"/>
+              <a:rPr lang="en-US" dirty="0"/>
               <a:t>Time-series</a:t>
             </a:r>
           </a:p>
           <a:p>
             <a:pPr lvl="2" indent="-342900"/>
             <a:r>
-              <a:rPr lang="en-US" dirty="0" smtClean="0"/>
+              <a:rPr lang="en-US" dirty="0"/>
               <a:t>What’s the probability distribution for escapement of chinook salmon in the snake river in 2011, given that you’ve sampled escapement from 1980-2010?</a:t>
             </a:r>
           </a:p>
@@ -12134,14 +13395,14 @@
               <a:buAutoNum type="arabicPeriod"/>
             </a:pPr>
             <a:r>
-              <a:rPr lang="en-US" dirty="0" smtClean="0"/>
+              <a:rPr lang="en-US" dirty="0"/>
               <a:t>Occupancy </a:t>
             </a:r>
           </a:p>
           <a:p>
             <a:pPr lvl="2" indent="-342900"/>
             <a:r>
-              <a:rPr lang="en-US" dirty="0" smtClean="0"/>
+              <a:rPr lang="en-US" dirty="0"/>
               <a:t>Three volunteers look for an endangered butterfly at a site, and only two find it.  These volunteers sample at a new site, and none see the butterfly.  What is the probability that is present but wasn’t detected?</a:t>
             </a:r>
           </a:p>
@@ -12161,13 +13422,6 @@
   <p:clrMapOvr>
     <a:masterClrMapping/>
   </p:clrMapOvr>
-  <p:timing>
-    <p:tnLst>
-      <p:par>
-        <p:cTn id="1" dur="indefinite" restart="never" nodeType="tmRoot"/>
-      </p:par>
-    </p:tnLst>
-  </p:timing>
 </p:sld>
 </file>
 
@@ -12233,7 +13487,7 @@
                   <a:buNone/>
                 </a:pPr>
                 <a:r>
-                  <a:rPr lang="en-US" dirty="0" smtClean="0"/>
+                  <a:rPr lang="en-US" dirty="0"/>
                   <a:t>Solution:</a:t>
                 </a:r>
               </a:p>
@@ -12486,11 +13740,7 @@
                 </a14:m>
                 <a:r>
                   <a:rPr lang="en-US" dirty="0"/>
-                  <a:t> is a “prior” or “hyper-distribution” for latent </a:t>
-                </a:r>
-                <a:r>
-                  <a:rPr lang="en-US" dirty="0" smtClean="0"/>
-                  <a:t>variables</a:t>
+                  <a:t> is a “prior” or “hyper-distribution” for latent variables</a:t>
                 </a:r>
               </a:p>
               <a:p>
@@ -12507,26 +13757,21 @@
                   </m:oMath>
                 </a14:m>
                 <a:r>
-                  <a:rPr lang="en-US" dirty="0" smtClean="0"/>
+                  <a:rPr lang="en-US" dirty="0"/>
                   <a:t> is sometimes called “augmented data”</a:t>
                 </a:r>
               </a:p>
               <a:p>
                 <a:pPr lvl="2"/>
                 <a:r>
-                  <a:rPr lang="en-US" dirty="0" smtClean="0"/>
+                  <a:rPr lang="en-US" dirty="0"/>
                   <a:t>Left side of the joint-likelihood</a:t>
                 </a:r>
-                <a:endParaRPr lang="en-US" dirty="0"/>
               </a:p>
               <a:p>
                 <a:r>
                   <a:rPr lang="en-US" dirty="0"/>
-                  <a:t>Calculate the marginal likelihood of parameters when integrating across random </a:t>
-                </a:r>
-                <a:r>
-                  <a:rPr lang="en-US" dirty="0" smtClean="0"/>
-                  <a:t>effects</a:t>
+                  <a:t>Calculate the marginal likelihood of parameters when integrating across random effects</a:t>
                 </a:r>
               </a:p>
               <a:p>
@@ -12901,7 +14146,7 @@
               <a:p>
                 <a:pPr lvl="1"/>
                 <a:r>
-                  <a:rPr lang="en-US" i="1" dirty="0" smtClean="0"/>
+                  <a:rPr lang="en-US" i="1" dirty="0"/>
                   <a:t>Marginalize – take a weighted average of likelihoods, where weights are given according to the probability of random effects, </a:t>
                 </a:r>
                 <a14:m>
@@ -13007,7 +14252,7 @@
             </p:nvSpPr>
             <p:spPr>
               <a:blipFill>
-                <a:blip r:embed="rId2"/>
+                <a:blip r:embed="rId3"/>
                 <a:stretch>
                   <a:fillRect l="-1085" t="-1949" r="-746"/>
                 </a:stretch>
@@ -13038,13 +14283,6 @@
   <p:clrMapOvr>
     <a:masterClrMapping/>
   </p:clrMapOvr>
-  <p:timing>
-    <p:tnLst>
-      <p:par>
-        <p:cTn id="1" dur="indefinite" restart="never" nodeType="tmRoot"/>
-      </p:par>
-    </p:tnLst>
-  </p:timing>
 </p:sld>
 </file>
 
@@ -13103,7 +14341,7 @@
               <a:buNone/>
             </a:pPr>
             <a:r>
-              <a:rPr lang="en-US" sz="3200" b="1" dirty="0" smtClean="0"/>
+              <a:rPr lang="en-US" sz="3200" b="1" dirty="0"/>
               <a:t>Definitions</a:t>
             </a:r>
           </a:p>
@@ -13156,10 +14394,9 @@
                     <a:lstStyle/>
                     <a:p>
                       <a:r>
-                        <a:rPr lang="en-US" sz="2800" dirty="0" smtClean="0"/>
+                        <a:rPr lang="en-US" sz="2800" dirty="0"/>
                         <a:t>Term</a:t>
                       </a:r>
-                      <a:endParaRPr lang="en-US" sz="2800" dirty="0"/>
                     </a:p>
                   </a:txBody>
                   <a:tcPr/>
@@ -13170,10 +14407,9 @@
                     <a:lstStyle/>
                     <a:p>
                       <a:r>
-                        <a:rPr lang="en-US" sz="2800" dirty="0" smtClean="0"/>
+                        <a:rPr lang="en-US" sz="2800" dirty="0"/>
                         <a:t>Definition</a:t>
                       </a:r>
-                      <a:endParaRPr lang="en-US" sz="2800" dirty="0"/>
                     </a:p>
                   </a:txBody>
                   <a:tcPr/>
@@ -13191,10 +14427,9 @@
                     <a:lstStyle/>
                     <a:p>
                       <a:r>
-                        <a:rPr lang="en-US" sz="2000" dirty="0" smtClean="0"/>
+                        <a:rPr lang="en-US" sz="2000" dirty="0"/>
                         <a:t>Random effect</a:t>
                       </a:r>
-                      <a:endParaRPr lang="en-US" sz="2000" dirty="0"/>
                     </a:p>
                   </a:txBody>
                   <a:tcPr/>
@@ -13205,11 +14440,11 @@
                     <a:lstStyle/>
                     <a:p>
                       <a:r>
-                        <a:rPr lang="en-US" sz="2000" dirty="0" smtClean="0"/>
+                        <a:rPr lang="en-US" sz="2000" dirty="0"/>
                         <a:t>Coefficient that is “exchangeable”</a:t>
                       </a:r>
                       <a:r>
-                        <a:rPr lang="en-US" sz="2000" baseline="0" dirty="0" smtClean="0"/>
+                        <a:rPr lang="en-US" sz="2000" baseline="0" dirty="0"/>
                         <a:t> with one or more other coefficients</a:t>
                       </a:r>
                       <a:endParaRPr lang="en-US" sz="2000" dirty="0"/>
@@ -13230,7 +14465,7 @@
                     <a:lstStyle/>
                     <a:p>
                       <a:r>
-                        <a:rPr lang="en-US" sz="2000" dirty="0" err="1" smtClean="0"/>
+                        <a:rPr lang="en-US" sz="2000" dirty="0" err="1"/>
                         <a:t>Hyperdistribution</a:t>
                       </a:r>
                       <a:endParaRPr lang="en-US" sz="2000" dirty="0"/>
@@ -13244,10 +14479,9 @@
                     <a:lstStyle/>
                     <a:p>
                       <a:r>
-                        <a:rPr lang="en-US" sz="2000" dirty="0" smtClean="0"/>
+                        <a:rPr lang="en-US" sz="2000" dirty="0"/>
                         <a:t>Distribution for “exchangeable” random effects</a:t>
                       </a:r>
-                      <a:endParaRPr lang="en-US" sz="2000" dirty="0"/>
                     </a:p>
                   </a:txBody>
                   <a:tcPr/>
@@ -13265,10 +14499,9 @@
                     <a:lstStyle/>
                     <a:p>
                       <a:r>
-                        <a:rPr lang="en-US" sz="2000" dirty="0" smtClean="0"/>
+                        <a:rPr lang="en-US" sz="2000" dirty="0"/>
                         <a:t>Exchangeable</a:t>
                       </a:r>
-                      <a:endParaRPr lang="en-US" sz="2000" dirty="0"/>
                     </a:p>
                   </a:txBody>
                   <a:tcPr/>
@@ -13279,11 +14512,11 @@
                     <a:lstStyle/>
                     <a:p>
                       <a:r>
-                        <a:rPr lang="en-US" sz="2000" dirty="0" smtClean="0"/>
+                        <a:rPr lang="en-US" sz="2000" dirty="0"/>
                         <a:t>No information is available to distinguish</a:t>
                       </a:r>
                       <a:r>
-                        <a:rPr lang="en-US" sz="2000" baseline="0" dirty="0" smtClean="0"/>
+                        <a:rPr lang="en-US" sz="2000" baseline="0" dirty="0"/>
                         <a:t> between residual variability in random effects</a:t>
                       </a:r>
                       <a:endParaRPr lang="en-US" sz="2000" dirty="0"/>
@@ -13304,10 +14537,9 @@
                     <a:lstStyle/>
                     <a:p>
                       <a:r>
-                        <a:rPr lang="en-US" sz="2000" dirty="0" smtClean="0"/>
+                        <a:rPr lang="en-US" sz="2000" dirty="0"/>
                         <a:t>Fixed effect</a:t>
                       </a:r>
-                      <a:endParaRPr lang="en-US" sz="2000" dirty="0"/>
                     </a:p>
                   </a:txBody>
                   <a:tcPr/>
@@ -13318,15 +14550,15 @@
                     <a:lstStyle/>
                     <a:p>
                       <a:r>
-                        <a:rPr lang="en-US" sz="2000" dirty="0" smtClean="0"/>
+                        <a:rPr lang="en-US" sz="2000" dirty="0"/>
                         <a:t>Coefficient</a:t>
                       </a:r>
                       <a:r>
-                        <a:rPr lang="en-US" sz="2000" baseline="0" dirty="0" smtClean="0"/>
+                        <a:rPr lang="en-US" sz="2000" baseline="0" dirty="0"/>
                         <a:t> that is not exchangeable with others, and which hence is estimated without a </a:t>
                       </a:r>
                       <a:r>
-                        <a:rPr lang="en-US" sz="2000" baseline="0" dirty="0" err="1" smtClean="0"/>
+                        <a:rPr lang="en-US" sz="2000" baseline="0" dirty="0" err="1"/>
                         <a:t>hyperdistribution</a:t>
                       </a:r>
                       <a:endParaRPr lang="en-US" sz="2000" dirty="0"/>
@@ -13347,10 +14579,9 @@
                     <a:lstStyle/>
                     <a:p>
                       <a:r>
-                        <a:rPr lang="en-US" sz="2000" dirty="0" smtClean="0"/>
+                        <a:rPr lang="en-US" sz="2000" dirty="0"/>
                         <a:t>Mixed-effect model</a:t>
                       </a:r>
-                      <a:endParaRPr lang="en-US" sz="2000" dirty="0"/>
                     </a:p>
                   </a:txBody>
                   <a:tcPr/>
@@ -13361,11 +14592,11 @@
                     <a:lstStyle/>
                     <a:p>
                       <a:r>
-                        <a:rPr lang="en-US" sz="2000" dirty="0" smtClean="0"/>
+                        <a:rPr lang="en-US" sz="2000" dirty="0"/>
                         <a:t>Model</a:t>
                       </a:r>
                       <a:r>
-                        <a:rPr lang="en-US" sz="2000" baseline="0" dirty="0" smtClean="0"/>
+                        <a:rPr lang="en-US" sz="2000" baseline="0" dirty="0"/>
                         <a:t> with both fixed and random effects</a:t>
                       </a:r>
                       <a:endParaRPr lang="en-US" sz="2000" dirty="0"/>
@@ -13393,13 +14624,6 @@
   <p:clrMapOvr>
     <a:masterClrMapping/>
   </p:clrMapOvr>
-  <p:timing>
-    <p:tnLst>
-      <p:par>
-        <p:cTn id="1" dur="indefinite" restart="never" nodeType="tmRoot"/>
-      </p:par>
-    </p:tnLst>
-  </p:timing>
 </p:sld>
 </file>
 
@@ -13463,7 +14687,7 @@
               <a:buNone/>
             </a:pPr>
             <a:r>
-              <a:rPr lang="en-US" sz="3200" b="1" dirty="0" smtClean="0"/>
+              <a:rPr lang="en-US" sz="3200" b="1" dirty="0"/>
               <a:t>Why would you make a hierarchy of parameters</a:t>
             </a:r>
           </a:p>
@@ -13473,7 +14697,7 @@
               <a:buAutoNum type="arabicPeriod"/>
             </a:pPr>
             <a:r>
-              <a:rPr lang="en-US" sz="2800" dirty="0" smtClean="0"/>
+              <a:rPr lang="en-US" sz="2800" dirty="0"/>
               <a:t>Biological intuition – Formulate models based on knowledge of constituent parts (Burnham and Anderson 2008)</a:t>
             </a:r>
           </a:p>
@@ -13483,7 +14707,7 @@
               <a:buAutoNum type="arabicPeriod"/>
             </a:pPr>
             <a:r>
-              <a:rPr lang="en-US" sz="2800" dirty="0" smtClean="0"/>
+              <a:rPr lang="en-US" sz="2800" dirty="0"/>
               <a:t>Variance partitioning – Separate different sources of variability (e.g., measurement errors!)</a:t>
             </a:r>
           </a:p>
@@ -13493,7 +14717,7 @@
               <a:buAutoNum type="arabicPeriod"/>
             </a:pPr>
             <a:r>
-              <a:rPr lang="en-US" sz="2800" dirty="0" smtClean="0"/>
+              <a:rPr lang="en-US" sz="2800" dirty="0"/>
               <a:t>Shrinkage – Often improve precision from assuming parameters arise from a distribution</a:t>
             </a:r>
           </a:p>
@@ -13516,13 +14740,6 @@
   <p:clrMapOvr>
     <a:masterClrMapping/>
   </p:clrMapOvr>
-  <p:timing>
-    <p:tnLst>
-      <p:par>
-        <p:cTn id="1" dur="indefinite" restart="never" nodeType="tmRoot"/>
-      </p:par>
-    </p:tnLst>
-  </p:timing>
 </p:sld>
 </file>
 
@@ -13586,30 +14803,14 @@
                   <a:buNone/>
                 </a:pPr>
                 <a:r>
-                  <a:rPr lang="en-US" sz="3200" b="1" dirty="0" smtClean="0"/>
-                  <a:t>Stein’s </a:t>
-                </a:r>
-                <a:r>
                   <a:rPr lang="en-US" sz="3200" b="1" dirty="0"/>
-                  <a:t>paradox </a:t>
+                  <a:t>Stein’s paradox </a:t>
                 </a:r>
               </a:p>
               <a:p>
                 <a:r>
-                  <a:rPr lang="en-US" dirty="0" smtClean="0"/>
-                  <a:t>Pooling </a:t>
-                </a:r>
-                <a:r>
                   <a:rPr lang="en-US" dirty="0"/>
-                  <a:t>parameters towards a mean will be more accurate on </a:t>
-                </a:r>
-                <a:r>
-                  <a:rPr lang="en-US" dirty="0" smtClean="0"/>
-                  <a:t>average </a:t>
-                </a:r>
-                <a:r>
-                  <a:rPr lang="en-US" dirty="0"/>
-                  <a:t>(</a:t>
+                  <a:t>Pooling parameters towards a mean will be more accurate on average (</a:t>
                 </a:r>
                 <a:r>
                   <a:rPr lang="en-US" dirty="0" err="1"/>
@@ -13623,7 +14824,7 @@
               <a:p>
                 <a:pPr lvl="1" indent="-342900"/>
                 <a:r>
-                  <a:rPr lang="en-US" dirty="0" smtClean="0"/>
+                  <a:rPr lang="en-US" dirty="0"/>
                   <a:t>Say we have a batter with 100 at bats, and 35 hits</a:t>
                 </a:r>
               </a:p>
@@ -13640,7 +14841,7 @@
                   </m:oMath>
                 </a14:m>
                 <a:r>
-                  <a:rPr lang="en-US" dirty="0" smtClean="0"/>
+                  <a:rPr lang="en-US" dirty="0"/>
                   <a:t>:  Batting average (</a:t>
                 </a:r>
                 <a14:m>
@@ -13654,10 +14855,9 @@
                   </m:oMath>
                 </a14:m>
                 <a:r>
-                  <a:rPr lang="en-US" dirty="0" smtClean="0"/>
+                  <a:rPr lang="en-US" dirty="0"/>
                   <a:t>=0.35)</a:t>
                 </a:r>
-                <a:endParaRPr lang="en-US" dirty="0"/>
               </a:p>
               <a:p>
                 <a:pPr lvl="2" indent="-342900"/>
@@ -13672,7 +14872,7 @@
                   </m:oMath>
                 </a14:m>
                 <a:r>
-                  <a:rPr lang="en-US" dirty="0" smtClean="0"/>
+                  <a:rPr lang="en-US" dirty="0"/>
                   <a:t>:  Best prediction of future probability of hit (</a:t>
                 </a:r>
                 <a14:m>
@@ -13686,14 +14886,14 @@
                   </m:oMath>
                 </a14:m>
                 <a:r>
-                  <a:rPr lang="en-US" dirty="0" smtClean="0"/>
+                  <a:rPr lang="en-US" dirty="0"/>
                   <a:t>=0.35)</a:t>
                 </a:r>
               </a:p>
               <a:p>
                 <a:pPr lvl="1" indent="-342900"/>
                 <a:r>
-                  <a:rPr lang="en-US" dirty="0" smtClean="0"/>
+                  <a:rPr lang="en-US" dirty="0"/>
                   <a:t>Say we have three batters</a:t>
                 </a:r>
               </a:p>
@@ -13711,11 +14911,7 @@
                 </a14:m>
                 <a:r>
                   <a:rPr lang="en-US" dirty="0"/>
-                  <a:t>: </a:t>
-                </a:r>
-                <a:r>
-                  <a:rPr lang="en-US" dirty="0" smtClean="0"/>
-                  <a:t>Batting average (</a:t>
+                  <a:t>: Batting average (</a:t>
                 </a:r>
                 <a14:m>
                   <m:oMath xmlns:m="http://schemas.openxmlformats.org/officeDocument/2006/math">
@@ -13773,7 +14969,7 @@
                   </m:oMath>
                 </a14:m>
                 <a:r>
-                  <a:rPr lang="en-US" dirty="0" smtClean="0"/>
+                  <a:rPr lang="en-US" dirty="0"/>
                   <a:t>)</a:t>
                 </a:r>
               </a:p>
@@ -13790,7 +14986,7 @@
                   </m:oMath>
                 </a14:m>
                 <a:r>
-                  <a:rPr lang="en-US" dirty="0" smtClean="0"/>
+                  <a:rPr lang="en-US" dirty="0"/>
                   <a:t>:  Best prediction of future probability of hit</a:t>
                 </a:r>
               </a:p>
@@ -13878,12 +15074,12 @@
                     </m:oMath>
                   </m:oMathPara>
                 </a14:m>
-                <a:endParaRPr lang="en-US" b="1" dirty="0" smtClean="0"/>
+                <a:endParaRPr lang="en-US" b="1" dirty="0"/>
               </a:p>
               <a:p>
                 <a:pPr lvl="3" indent="-342900"/>
                 <a:r>
-                  <a:rPr lang="en-US" dirty="0" smtClean="0"/>
+                  <a:rPr lang="en-US" dirty="0"/>
                   <a:t>Where </a:t>
                 </a:r>
                 <a14:m>
@@ -13897,7 +15093,7 @@
                   </m:oMath>
                 </a14:m>
                 <a:r>
-                  <a:rPr lang="en-US" dirty="0" smtClean="0"/>
+                  <a:rPr lang="en-US" dirty="0"/>
                   <a:t> is the magnitude of shrinkage, </a:t>
                 </a:r>
                 <a14:m>
@@ -13922,7 +15118,7 @@
                     </m:r>
                   </m:oMath>
                 </a14:m>
-                <a:endParaRPr lang="en-US" dirty="0" smtClean="0"/>
+                <a:endParaRPr lang="en-US" dirty="0"/>
               </a:p>
             </p:txBody>
           </p:sp>
@@ -13940,7 +15136,7 @@
             </p:nvSpPr>
             <p:spPr>
               <a:blipFill>
-                <a:blip r:embed="rId2"/>
+                <a:blip r:embed="rId3"/>
                 <a:stretch>
                   <a:fillRect l="-1763" t="-1333" r="-1288"/>
                 </a:stretch>
@@ -13971,13 +15167,6 @@
   <p:clrMapOvr>
     <a:masterClrMapping/>
   </p:clrMapOvr>
-  <p:timing>
-    <p:tnLst>
-      <p:par>
-        <p:cTn id="1" dur="indefinite" restart="never" nodeType="tmRoot"/>
-      </p:par>
-    </p:tnLst>
-  </p:timing>
 </p:sld>
 </file>
 

</xml_diff>